<commit_message>
Added animation to PowerPoints
</commit_message>
<xml_diff>
--- a/Algemeen over Dojos/Coding Dojo.pptx
+++ b/Algemeen over Dojos/Coding Dojo.pptx
@@ -6300,6 +6300,28 @@
           <a:bodyPr/>
           <a:lstStyle/>
           <a:p>
+            <a:pPr marL="0" indent="0">
+              <a:lnSpc>
+                <a:spcPct val="100000"/>
+              </a:lnSpc>
+              <a:buNone/>
+            </a:pPr>
+            <a:r>
+              <a:rPr lang="nl-NL" sz="3200" dirty="0" smtClean="0"/>
+              <a:t>Deel 1 </a:t>
+            </a:r>
+            <a:r>
+              <a:rPr lang="nl-NL" sz="3200" dirty="0" smtClean="0">
+                <a:solidFill>
+                  <a:schemeClr val="bg1">
+                    <a:lumMod val="65000"/>
+                  </a:schemeClr>
+                </a:solidFill>
+              </a:rPr>
+              <a:t>(+/- 15 minuten)</a:t>
+            </a:r>
+          </a:p>
+          <a:p>
             <a:pPr>
               <a:lnSpc>
                 <a:spcPct val="100000"/>
@@ -6307,7 +6329,11 @@
             </a:pPr>
             <a:r>
               <a:rPr lang="nl-NL" sz="2800" dirty="0" smtClean="0"/>
-              <a:t>Wat is een (</a:t>
+              <a:t>Wat </a:t>
+            </a:r>
+            <a:r>
+              <a:rPr lang="nl-NL" sz="2800" dirty="0" smtClean="0"/>
+              <a:t>is een (</a:t>
             </a:r>
             <a:r>
               <a:rPr lang="nl-NL" sz="2800" dirty="0" err="1" smtClean="0"/>
@@ -6338,6 +6364,49 @@
               <a:t>kata</a:t>
             </a:r>
             <a:endParaRPr lang="nl-NL" sz="2800" dirty="0" smtClean="0"/>
+          </a:p>
+          <a:p>
+            <a:pPr>
+              <a:lnSpc>
+                <a:spcPct val="100000"/>
+              </a:lnSpc>
+            </a:pPr>
+            <a:r>
+              <a:rPr lang="nl-NL" sz="2800" dirty="0" smtClean="0"/>
+              <a:t>Principes </a:t>
+            </a:r>
+            <a:r>
+              <a:rPr lang="nl-NL" sz="2800" dirty="0" smtClean="0"/>
+              <a:t>van een </a:t>
+            </a:r>
+            <a:r>
+              <a:rPr lang="nl-NL" sz="2800" dirty="0" err="1" smtClean="0"/>
+              <a:t>coding</a:t>
+            </a:r>
+            <a:r>
+              <a:rPr lang="nl-NL" sz="2800" dirty="0" smtClean="0"/>
+              <a:t> </a:t>
+            </a:r>
+            <a:r>
+              <a:rPr lang="nl-NL" sz="2800" dirty="0" err="1" smtClean="0"/>
+              <a:t>dojo</a:t>
+            </a:r>
+            <a:endParaRPr lang="nl-NL" sz="2800" dirty="0" smtClean="0"/>
+          </a:p>
+          <a:p>
+            <a:pPr>
+              <a:lnSpc>
+                <a:spcPct val="100000"/>
+              </a:lnSpc>
+            </a:pPr>
+            <a:r>
+              <a:rPr lang="nl-NL" sz="2800" dirty="0" smtClean="0"/>
+              <a:t>Basis </a:t>
+            </a:r>
+            <a:r>
+              <a:rPr lang="nl-NL" sz="2800" dirty="0" smtClean="0"/>
+              <a:t>skills waarmee we te maken gaan krijgen</a:t>
+            </a:r>
           </a:p>
           <a:p>
             <a:pPr>
@@ -6348,6 +6417,19 @@
             <a:endParaRPr lang="nl-NL" sz="2800" dirty="0" smtClean="0"/>
           </a:p>
           <a:p>
+            <a:pPr marL="0" indent="0">
+              <a:lnSpc>
+                <a:spcPct val="100000"/>
+              </a:lnSpc>
+              <a:buNone/>
+            </a:pPr>
+            <a:r>
+              <a:rPr lang="nl-NL" sz="3200" dirty="0" smtClean="0"/>
+              <a:t>Deel 2:</a:t>
+            </a:r>
+            <a:endParaRPr lang="nl-NL" sz="3200" dirty="0"/>
+          </a:p>
+          <a:p>
             <a:pPr>
               <a:lnSpc>
                 <a:spcPct val="100000"/>
@@ -6355,21 +6437,37 @@
             </a:pPr>
             <a:r>
               <a:rPr lang="nl-NL" sz="2800" dirty="0" smtClean="0"/>
-              <a:t>Principes van een </a:t>
+              <a:t>Code </a:t>
             </a:r>
             <a:r>
               <a:rPr lang="nl-NL" sz="2800" dirty="0" err="1" smtClean="0"/>
-              <a:t>coding</a:t>
+              <a:t>kata</a:t>
             </a:r>
             <a:r>
               <a:rPr lang="nl-NL" sz="2800" dirty="0" smtClean="0"/>
-              <a:t> </a:t>
-            </a:r>
-            <a:r>
-              <a:rPr lang="nl-NL" sz="2800" dirty="0" err="1" smtClean="0"/>
-              <a:t>dojo</a:t>
-            </a:r>
-            <a:endParaRPr lang="nl-NL" sz="2800" dirty="0" smtClean="0"/>
+              <a:t> 1: De </a:t>
+            </a:r>
+            <a:r>
+              <a:rPr lang="nl-NL" sz="2800" dirty="0" smtClean="0"/>
+              <a:t>Calculator </a:t>
+            </a:r>
+            <a:r>
+              <a:rPr lang="nl-NL" sz="2800" dirty="0" smtClean="0">
+                <a:solidFill>
+                  <a:schemeClr val="bg1">
+                    <a:lumMod val="65000"/>
+                  </a:schemeClr>
+                </a:solidFill>
+              </a:rPr>
+              <a:t>(35 minuten)</a:t>
+            </a:r>
+            <a:endParaRPr lang="nl-NL" sz="2800" dirty="0" smtClean="0">
+              <a:solidFill>
+                <a:schemeClr val="bg1">
+                  <a:lumMod val="65000"/>
+                </a:schemeClr>
+              </a:solidFill>
+            </a:endParaRPr>
           </a:p>
           <a:p>
             <a:pPr>
@@ -6377,7 +6475,32 @@
                 <a:spcPct val="100000"/>
               </a:lnSpc>
             </a:pPr>
-            <a:endParaRPr lang="nl-NL" sz="2800" dirty="0" smtClean="0"/>
+            <a:r>
+              <a:rPr lang="nl-NL" sz="2800" dirty="0" smtClean="0"/>
+              <a:t>Code </a:t>
+            </a:r>
+            <a:r>
+              <a:rPr lang="nl-NL" sz="2800" dirty="0" err="1" smtClean="0"/>
+              <a:t>kata</a:t>
+            </a:r>
+            <a:r>
+              <a:rPr lang="nl-NL" sz="2800" dirty="0" smtClean="0"/>
+              <a:t> 2: The </a:t>
+            </a:r>
+            <a:r>
+              <a:rPr lang="nl-NL" sz="2800" dirty="0" smtClean="0"/>
+              <a:t>Warehouse </a:t>
+            </a:r>
+            <a:r>
+              <a:rPr lang="nl-NL" sz="2800" dirty="0" smtClean="0">
+                <a:solidFill>
+                  <a:schemeClr val="bg1">
+                    <a:lumMod val="65000"/>
+                  </a:schemeClr>
+                </a:solidFill>
+              </a:rPr>
+              <a:t>(85 minuten)</a:t>
+            </a:r>
           </a:p>
           <a:p>
             <a:pPr>
@@ -6386,64 +6509,30 @@
               </a:lnSpc>
             </a:pPr>
             <a:r>
+              <a:rPr lang="nl-NL" sz="2800" dirty="0"/>
+              <a:t>Retro / </a:t>
+            </a:r>
+            <a:r>
               <a:rPr lang="nl-NL" sz="2800" dirty="0" smtClean="0"/>
-              <a:t>Basis skills waarmee we te maken gaan krijgen</a:t>
-            </a:r>
-          </a:p>
-          <a:p>
-            <a:pPr>
-              <a:lnSpc>
-                <a:spcPct val="100000"/>
-              </a:lnSpc>
-            </a:pPr>
-            <a:endParaRPr lang="nl-NL" sz="2800" dirty="0"/>
-          </a:p>
-          <a:p>
-            <a:pPr>
-              <a:lnSpc>
-                <a:spcPct val="100000"/>
-              </a:lnSpc>
-            </a:pPr>
-            <a:r>
-              <a:rPr lang="nl-NL" sz="2800" dirty="0" smtClean="0"/>
-              <a:t>Code </a:t>
-            </a:r>
-            <a:r>
-              <a:rPr lang="nl-NL" sz="2800" dirty="0" err="1" smtClean="0"/>
-              <a:t>kata</a:t>
-            </a:r>
-            <a:r>
-              <a:rPr lang="nl-NL" sz="2800" dirty="0" smtClean="0"/>
-              <a:t> 1: De Calculator</a:t>
-            </a:r>
-          </a:p>
-          <a:p>
-            <a:pPr>
-              <a:lnSpc>
-                <a:spcPct val="100000"/>
-              </a:lnSpc>
-            </a:pPr>
-            <a:endParaRPr lang="nl-NL" sz="2800" dirty="0"/>
-          </a:p>
-          <a:p>
-            <a:pPr>
-              <a:lnSpc>
-                <a:spcPct val="100000"/>
-              </a:lnSpc>
-            </a:pPr>
-            <a:r>
-              <a:rPr lang="nl-NL" sz="2800" dirty="0" smtClean="0"/>
-              <a:t>Code </a:t>
-            </a:r>
-            <a:r>
-              <a:rPr lang="nl-NL" sz="2800" dirty="0" err="1" smtClean="0"/>
-              <a:t>kata</a:t>
-            </a:r>
-            <a:r>
-              <a:rPr lang="nl-NL" sz="2800" dirty="0" smtClean="0"/>
-              <a:t> 2: The Warehouse</a:t>
-            </a:r>
-            <a:endParaRPr lang="nl-NL" sz="2800" dirty="0"/>
+              <a:t>feedback </a:t>
+            </a:r>
+            <a:r>
+              <a:rPr lang="nl-NL" sz="2800" dirty="0" smtClean="0">
+                <a:solidFill>
+                  <a:schemeClr val="bg1">
+                    <a:lumMod val="65000"/>
+                  </a:schemeClr>
+                </a:solidFill>
+              </a:rPr>
+              <a:t>(15 minuten)</a:t>
+            </a:r>
+            <a:endParaRPr lang="nl-NL" sz="2800" dirty="0">
+              <a:solidFill>
+                <a:schemeClr val="bg1">
+                  <a:lumMod val="65000"/>
+                </a:schemeClr>
+              </a:solidFill>
+            </a:endParaRPr>
           </a:p>
           <a:p>
             <a:pPr>
@@ -6459,277 +6548,6 @@
     <p:extLst>
       <p:ext uri="{BB962C8B-B14F-4D97-AF65-F5344CB8AC3E}">
         <p14:creationId xmlns:p14="http://schemas.microsoft.com/office/powerpoint/2010/main" val="2044650383"/>
-      </p:ext>
-    </p:extLst>
-  </p:cSld>
-  <p:clrMapOvr>
-    <a:masterClrMapping/>
-  </p:clrMapOvr>
-  <p:timing>
-    <p:tnLst>
-      <p:par>
-        <p:cTn id="1" dur="indefinite" restart="never" nodeType="tmRoot"/>
-      </p:par>
-    </p:tnLst>
-  </p:timing>
-</p:sld>
-</file>
-
-<file path=ppt/slides/slide3.xml><?xml version="1.0" encoding="utf-8"?>
-<p:sld xmlns:a="http://schemas.openxmlformats.org/drawingml/2006/main" xmlns:r="http://schemas.openxmlformats.org/officeDocument/2006/relationships" xmlns:p="http://schemas.openxmlformats.org/presentationml/2006/main">
-  <p:cSld>
-    <p:spTree>
-      <p:nvGrpSpPr>
-        <p:cNvPr id="1" name=""/>
-        <p:cNvGrpSpPr/>
-        <p:nvPr/>
-      </p:nvGrpSpPr>
-      <p:grpSpPr>
-        <a:xfrm>
-          <a:off x="0" y="0"/>
-          <a:ext cx="0" cy="0"/>
-          <a:chOff x="0" y="0"/>
-          <a:chExt cx="0" cy="0"/>
-        </a:xfrm>
-      </p:grpSpPr>
-      <p:sp>
-        <p:nvSpPr>
-          <p:cNvPr id="33" name="Text Placeholder 3"/>
-          <p:cNvSpPr>
-            <a:spLocks noGrp="1"/>
-          </p:cNvSpPr>
-          <p:nvPr>
-            <p:ph type="body" sz="quarter" idx="13"/>
-          </p:nvPr>
-        </p:nvSpPr>
-        <p:spPr>
-          <a:xfrm>
-            <a:off x="962025" y="548680"/>
-            <a:ext cx="6516688" cy="424900"/>
-          </a:xfrm>
-        </p:spPr>
-        <p:txBody>
-          <a:bodyPr/>
-          <a:lstStyle/>
-          <a:p>
-            <a:r>
-              <a:rPr lang="nl-NL" dirty="0" smtClean="0">
-                <a:latin typeface="Bebas Neue" panose="020B0000000000000000" pitchFamily="34" charset="0"/>
-              </a:rPr>
-              <a:t>Wat is een (</a:t>
-            </a:r>
-            <a:r>
-              <a:rPr lang="nl-NL" dirty="0" err="1" smtClean="0">
-                <a:latin typeface="Bebas Neue" panose="020B0000000000000000" pitchFamily="34" charset="0"/>
-              </a:rPr>
-              <a:t>coding</a:t>
-            </a:r>
-            <a:r>
-              <a:rPr lang="nl-NL" dirty="0" smtClean="0">
-                <a:latin typeface="Bebas Neue" panose="020B0000000000000000" pitchFamily="34" charset="0"/>
-              </a:rPr>
-              <a:t>) </a:t>
-            </a:r>
-            <a:r>
-              <a:rPr lang="nl-NL" dirty="0" err="1" smtClean="0">
-                <a:latin typeface="Bebas Neue" panose="020B0000000000000000" pitchFamily="34" charset="0"/>
-              </a:rPr>
-              <a:t>dojo</a:t>
-            </a:r>
-            <a:r>
-              <a:rPr lang="nl-NL" dirty="0" smtClean="0">
-                <a:latin typeface="Bebas Neue" panose="020B0000000000000000" pitchFamily="34" charset="0"/>
-              </a:rPr>
-              <a:t>?</a:t>
-            </a:r>
-            <a:endParaRPr lang="nl-NL" dirty="0">
-              <a:latin typeface="Bebas Neue" panose="020B0000000000000000" pitchFamily="34" charset="0"/>
-            </a:endParaRPr>
-          </a:p>
-        </p:txBody>
-      </p:sp>
-      <p:sp>
-        <p:nvSpPr>
-          <p:cNvPr id="34" name="Text Placeholder 3"/>
-          <p:cNvSpPr>
-            <a:spLocks noGrp="1"/>
-          </p:cNvSpPr>
-          <p:nvPr>
-            <p:ph type="body" sz="quarter" idx="13"/>
-          </p:nvPr>
-        </p:nvSpPr>
-        <p:spPr>
-          <a:xfrm>
-            <a:off x="962025" y="945887"/>
-            <a:ext cx="6516688" cy="353233"/>
-          </a:xfrm>
-        </p:spPr>
-        <p:txBody>
-          <a:bodyPr/>
-          <a:lstStyle/>
-          <a:p>
-            <a:r>
-              <a:rPr lang="nl-NL" sz="2000" dirty="0" smtClean="0">
-                <a:solidFill>
-                  <a:srgbClr val="A5CD39"/>
-                </a:solidFill>
-                <a:latin typeface="Bebas Neue" panose="020B0000000000000000" pitchFamily="34" charset="0"/>
-              </a:rPr>
-              <a:t>definitie</a:t>
-            </a:r>
-            <a:endParaRPr lang="nl-NL" sz="2000" dirty="0">
-              <a:solidFill>
-                <a:srgbClr val="A5CD39"/>
-              </a:solidFill>
-              <a:latin typeface="Bebas Neue" panose="020B0000000000000000" pitchFamily="34" charset="0"/>
-            </a:endParaRPr>
-          </a:p>
-        </p:txBody>
-      </p:sp>
-      <p:sp>
-        <p:nvSpPr>
-          <p:cNvPr id="6" name="Text Placeholder 2"/>
-          <p:cNvSpPr>
-            <a:spLocks noGrp="1"/>
-          </p:cNvSpPr>
-          <p:nvPr>
-            <p:ph type="body" sz="quarter" idx="12"/>
-          </p:nvPr>
-        </p:nvSpPr>
-        <p:spPr>
-          <a:xfrm>
-            <a:off x="962024" y="1696327"/>
-            <a:ext cx="7858447" cy="4685001"/>
-          </a:xfrm>
-        </p:spPr>
-        <p:txBody>
-          <a:bodyPr/>
-          <a:lstStyle/>
-          <a:p>
-            <a:pPr marL="0" indent="0">
-              <a:lnSpc>
-                <a:spcPct val="100000"/>
-              </a:lnSpc>
-              <a:buNone/>
-            </a:pPr>
-            <a:r>
-              <a:rPr lang="nl-NL" sz="2800" dirty="0" smtClean="0"/>
-              <a:t>Wat is een </a:t>
-            </a:r>
-            <a:r>
-              <a:rPr lang="nl-NL" sz="2800" dirty="0" err="1" smtClean="0"/>
-              <a:t>Dojo</a:t>
-            </a:r>
-            <a:r>
-              <a:rPr lang="nl-NL" sz="2800" dirty="0" smtClean="0"/>
-              <a:t>?</a:t>
-            </a:r>
-          </a:p>
-          <a:p>
-            <a:pPr>
-              <a:lnSpc>
-                <a:spcPct val="100000"/>
-              </a:lnSpc>
-            </a:pPr>
-            <a:r>
-              <a:rPr lang="nl-NL" dirty="0" smtClean="0"/>
-              <a:t>Japans: </a:t>
-            </a:r>
-            <a:r>
-              <a:rPr lang="nl-NL" i="1" dirty="0"/>
-              <a:t>de plaats waar men de weg </a:t>
-            </a:r>
-            <a:r>
-              <a:rPr lang="nl-NL" i="1" dirty="0" smtClean="0"/>
-              <a:t>leert</a:t>
-            </a:r>
-          </a:p>
-          <a:p>
-            <a:pPr>
-              <a:lnSpc>
-                <a:spcPct val="100000"/>
-              </a:lnSpc>
-            </a:pPr>
-            <a:endParaRPr lang="nl-NL" dirty="0" smtClean="0"/>
-          </a:p>
-          <a:p>
-            <a:pPr>
-              <a:lnSpc>
-                <a:spcPct val="100000"/>
-              </a:lnSpc>
-            </a:pPr>
-            <a:r>
-              <a:rPr lang="nl-NL" dirty="0" smtClean="0"/>
-              <a:t>Oefenruimte</a:t>
-            </a:r>
-          </a:p>
-          <a:p>
-            <a:pPr>
-              <a:lnSpc>
-                <a:spcPct val="100000"/>
-              </a:lnSpc>
-            </a:pPr>
-            <a:endParaRPr lang="nl-NL" dirty="0" smtClean="0"/>
-          </a:p>
-          <a:p>
-            <a:pPr>
-              <a:lnSpc>
-                <a:spcPct val="100000"/>
-              </a:lnSpc>
-            </a:pPr>
-            <a:r>
-              <a:rPr lang="nl-NL" dirty="0" smtClean="0"/>
-              <a:t>Trainingsplaats </a:t>
-            </a:r>
-            <a:r>
-              <a:rPr lang="nl-NL" dirty="0"/>
-              <a:t>Voor </a:t>
-            </a:r>
-            <a:r>
-              <a:rPr lang="nl-NL" dirty="0" smtClean="0"/>
-              <a:t>Krijgskunsten</a:t>
-            </a:r>
-          </a:p>
-          <a:p>
-            <a:pPr>
-              <a:lnSpc>
-                <a:spcPct val="100000"/>
-              </a:lnSpc>
-            </a:pPr>
-            <a:endParaRPr lang="nl-NL" sz="1800" dirty="0" smtClean="0"/>
-          </a:p>
-          <a:p>
-            <a:pPr>
-              <a:lnSpc>
-                <a:spcPct val="100000"/>
-              </a:lnSpc>
-            </a:pPr>
-            <a:endParaRPr lang="nl-NL" sz="1800" dirty="0"/>
-          </a:p>
-          <a:p>
-            <a:pPr marL="0" indent="0">
-              <a:lnSpc>
-                <a:spcPct val="100000"/>
-              </a:lnSpc>
-              <a:buNone/>
-            </a:pPr>
-            <a:endParaRPr lang="nl-NL" sz="1800" dirty="0" smtClean="0"/>
-          </a:p>
-          <a:p>
-            <a:pPr marL="0" indent="0">
-              <a:lnSpc>
-                <a:spcPct val="100000"/>
-              </a:lnSpc>
-              <a:buNone/>
-            </a:pPr>
-            <a:endParaRPr lang="nl-NL" sz="1800" dirty="0"/>
-          </a:p>
-        </p:txBody>
-      </p:sp>
-    </p:spTree>
-    <p:extLst>
-      <p:ext uri="{BB962C8B-B14F-4D97-AF65-F5344CB8AC3E}">
-        <p14:creationId xmlns:p14="http://schemas.microsoft.com/office/powerpoint/2010/main" val="3989856801"/>
       </p:ext>
     </p:extLst>
   </p:cSld>
@@ -6757,7 +6575,7 @@
                             </p:stCondLst>
                             <p:childTnLst>
                               <p:par>
-                                <p:cTn id="5" presetID="22" presetClass="entr" presetSubtype="4" fill="hold" nodeType="clickEffect">
+                                <p:cTn id="5" presetID="10" presetClass="entr" presetSubtype="0" fill="hold" nodeType="clickEffect">
                                   <p:stCondLst>
                                     <p:cond delay="0"/>
                                   </p:stCondLst>
@@ -6784,7 +6602,7 @@
                                         <p:strVal val="visible"/>
                                       </p:to>
                                     </p:set>
-                                    <p:animEffect transition="in" filter="wipe(down)">
+                                    <p:animEffect transition="in" filter="fade">
                                       <p:cBhvr>
                                         <p:cTn id="7" dur="500"/>
                                         <p:tgtEl>
@@ -6793,6 +6611,699 @@
                                               <p:pRg st="0" end="0"/>
                                             </p:txEl>
                                           </p:spTgt>
+                                        </p:tgtEl>
+                                      </p:cBhvr>
+                                    </p:animEffect>
+                                  </p:childTnLst>
+                                </p:cTn>
+                              </p:par>
+                              <p:par>
+                                <p:cTn id="8" presetID="10" presetClass="entr" presetSubtype="0" fill="hold" nodeType="withEffect">
+                                  <p:stCondLst>
+                                    <p:cond delay="0"/>
+                                  </p:stCondLst>
+                                  <p:childTnLst>
+                                    <p:set>
+                                      <p:cBhvr>
+                                        <p:cTn id="9" dur="1" fill="hold">
+                                          <p:stCondLst>
+                                            <p:cond delay="0"/>
+                                          </p:stCondLst>
+                                        </p:cTn>
+                                        <p:tgtEl>
+                                          <p:spTgt spid="6">
+                                            <p:txEl>
+                                              <p:pRg st="1" end="1"/>
+                                            </p:txEl>
+                                          </p:spTgt>
+                                        </p:tgtEl>
+                                        <p:attrNameLst>
+                                          <p:attrName>style.visibility</p:attrName>
+                                        </p:attrNameLst>
+                                      </p:cBhvr>
+                                      <p:to>
+                                        <p:strVal val="visible"/>
+                                      </p:to>
+                                    </p:set>
+                                    <p:animEffect transition="in" filter="fade">
+                                      <p:cBhvr>
+                                        <p:cTn id="10" dur="500"/>
+                                        <p:tgtEl>
+                                          <p:spTgt spid="6">
+                                            <p:txEl>
+                                              <p:pRg st="1" end="1"/>
+                                            </p:txEl>
+                                          </p:spTgt>
+                                        </p:tgtEl>
+                                      </p:cBhvr>
+                                    </p:animEffect>
+                                  </p:childTnLst>
+                                </p:cTn>
+                              </p:par>
+                              <p:par>
+                                <p:cTn id="11" presetID="10" presetClass="entr" presetSubtype="0" fill="hold" nodeType="withEffect">
+                                  <p:stCondLst>
+                                    <p:cond delay="0"/>
+                                  </p:stCondLst>
+                                  <p:childTnLst>
+                                    <p:set>
+                                      <p:cBhvr>
+                                        <p:cTn id="12" dur="1" fill="hold">
+                                          <p:stCondLst>
+                                            <p:cond delay="0"/>
+                                          </p:stCondLst>
+                                        </p:cTn>
+                                        <p:tgtEl>
+                                          <p:spTgt spid="6">
+                                            <p:txEl>
+                                              <p:pRg st="3" end="3"/>
+                                            </p:txEl>
+                                          </p:spTgt>
+                                        </p:tgtEl>
+                                        <p:attrNameLst>
+                                          <p:attrName>style.visibility</p:attrName>
+                                        </p:attrNameLst>
+                                      </p:cBhvr>
+                                      <p:to>
+                                        <p:strVal val="visible"/>
+                                      </p:to>
+                                    </p:set>
+                                    <p:animEffect transition="in" filter="fade">
+                                      <p:cBhvr>
+                                        <p:cTn id="13" dur="500"/>
+                                        <p:tgtEl>
+                                          <p:spTgt spid="6">
+                                            <p:txEl>
+                                              <p:pRg st="3" end="3"/>
+                                            </p:txEl>
+                                          </p:spTgt>
+                                        </p:tgtEl>
+                                      </p:cBhvr>
+                                    </p:animEffect>
+                                  </p:childTnLst>
+                                </p:cTn>
+                              </p:par>
+                              <p:par>
+                                <p:cTn id="14" presetID="10" presetClass="entr" presetSubtype="0" fill="hold" nodeType="withEffect">
+                                  <p:stCondLst>
+                                    <p:cond delay="0"/>
+                                  </p:stCondLst>
+                                  <p:childTnLst>
+                                    <p:set>
+                                      <p:cBhvr>
+                                        <p:cTn id="15" dur="1" fill="hold">
+                                          <p:stCondLst>
+                                            <p:cond delay="0"/>
+                                          </p:stCondLst>
+                                        </p:cTn>
+                                        <p:tgtEl>
+                                          <p:spTgt spid="6">
+                                            <p:txEl>
+                                              <p:pRg st="2" end="2"/>
+                                            </p:txEl>
+                                          </p:spTgt>
+                                        </p:tgtEl>
+                                        <p:attrNameLst>
+                                          <p:attrName>style.visibility</p:attrName>
+                                        </p:attrNameLst>
+                                      </p:cBhvr>
+                                      <p:to>
+                                        <p:strVal val="visible"/>
+                                      </p:to>
+                                    </p:set>
+                                    <p:animEffect transition="in" filter="fade">
+                                      <p:cBhvr>
+                                        <p:cTn id="16" dur="500"/>
+                                        <p:tgtEl>
+                                          <p:spTgt spid="6">
+                                            <p:txEl>
+                                              <p:pRg st="2" end="2"/>
+                                            </p:txEl>
+                                          </p:spTgt>
+                                        </p:tgtEl>
+                                      </p:cBhvr>
+                                    </p:animEffect>
+                                  </p:childTnLst>
+                                </p:cTn>
+                              </p:par>
+                            </p:childTnLst>
+                          </p:cTn>
+                        </p:par>
+                      </p:childTnLst>
+                    </p:cTn>
+                  </p:par>
+                  <p:par>
+                    <p:cTn id="17" fill="hold">
+                      <p:stCondLst>
+                        <p:cond delay="indefinite"/>
+                      </p:stCondLst>
+                      <p:childTnLst>
+                        <p:par>
+                          <p:cTn id="18" fill="hold">
+                            <p:stCondLst>
+                              <p:cond delay="0"/>
+                            </p:stCondLst>
+                            <p:childTnLst>
+                              <p:par>
+                                <p:cTn id="19" presetID="10" presetClass="entr" presetSubtype="0" fill="hold" nodeType="clickEffect">
+                                  <p:stCondLst>
+                                    <p:cond delay="0"/>
+                                  </p:stCondLst>
+                                  <p:childTnLst>
+                                    <p:set>
+                                      <p:cBhvr>
+                                        <p:cTn id="20" dur="1" fill="hold">
+                                          <p:stCondLst>
+                                            <p:cond delay="0"/>
+                                          </p:stCondLst>
+                                        </p:cTn>
+                                        <p:tgtEl>
+                                          <p:spTgt spid="6">
+                                            <p:txEl>
+                                              <p:pRg st="5" end="5"/>
+                                            </p:txEl>
+                                          </p:spTgt>
+                                        </p:tgtEl>
+                                        <p:attrNameLst>
+                                          <p:attrName>style.visibility</p:attrName>
+                                        </p:attrNameLst>
+                                      </p:cBhvr>
+                                      <p:to>
+                                        <p:strVal val="visible"/>
+                                      </p:to>
+                                    </p:set>
+                                    <p:animEffect transition="in" filter="fade">
+                                      <p:cBhvr>
+                                        <p:cTn id="21" dur="500"/>
+                                        <p:tgtEl>
+                                          <p:spTgt spid="6">
+                                            <p:txEl>
+                                              <p:pRg st="5" end="5"/>
+                                            </p:txEl>
+                                          </p:spTgt>
+                                        </p:tgtEl>
+                                      </p:cBhvr>
+                                    </p:animEffect>
+                                  </p:childTnLst>
+                                </p:cTn>
+                              </p:par>
+                              <p:par>
+                                <p:cTn id="22" presetID="10" presetClass="entr" presetSubtype="0" fill="hold" nodeType="withEffect">
+                                  <p:stCondLst>
+                                    <p:cond delay="0"/>
+                                  </p:stCondLst>
+                                  <p:childTnLst>
+                                    <p:set>
+                                      <p:cBhvr>
+                                        <p:cTn id="23" dur="1" fill="hold">
+                                          <p:stCondLst>
+                                            <p:cond delay="0"/>
+                                          </p:stCondLst>
+                                        </p:cTn>
+                                        <p:tgtEl>
+                                          <p:spTgt spid="6">
+                                            <p:txEl>
+                                              <p:pRg st="6" end="6"/>
+                                            </p:txEl>
+                                          </p:spTgt>
+                                        </p:tgtEl>
+                                        <p:attrNameLst>
+                                          <p:attrName>style.visibility</p:attrName>
+                                        </p:attrNameLst>
+                                      </p:cBhvr>
+                                      <p:to>
+                                        <p:strVal val="visible"/>
+                                      </p:to>
+                                    </p:set>
+                                    <p:animEffect transition="in" filter="fade">
+                                      <p:cBhvr>
+                                        <p:cTn id="24" dur="500"/>
+                                        <p:tgtEl>
+                                          <p:spTgt spid="6">
+                                            <p:txEl>
+                                              <p:pRg st="6" end="6"/>
+                                            </p:txEl>
+                                          </p:spTgt>
+                                        </p:tgtEl>
+                                      </p:cBhvr>
+                                    </p:animEffect>
+                                  </p:childTnLst>
+                                </p:cTn>
+                              </p:par>
+                              <p:par>
+                                <p:cTn id="25" presetID="10" presetClass="entr" presetSubtype="0" fill="hold" nodeType="withEffect">
+                                  <p:stCondLst>
+                                    <p:cond delay="0"/>
+                                  </p:stCondLst>
+                                  <p:childTnLst>
+                                    <p:set>
+                                      <p:cBhvr>
+                                        <p:cTn id="26" dur="1" fill="hold">
+                                          <p:stCondLst>
+                                            <p:cond delay="0"/>
+                                          </p:stCondLst>
+                                        </p:cTn>
+                                        <p:tgtEl>
+                                          <p:spTgt spid="6">
+                                            <p:txEl>
+                                              <p:pRg st="7" end="7"/>
+                                            </p:txEl>
+                                          </p:spTgt>
+                                        </p:tgtEl>
+                                        <p:attrNameLst>
+                                          <p:attrName>style.visibility</p:attrName>
+                                        </p:attrNameLst>
+                                      </p:cBhvr>
+                                      <p:to>
+                                        <p:strVal val="visible"/>
+                                      </p:to>
+                                    </p:set>
+                                    <p:animEffect transition="in" filter="fade">
+                                      <p:cBhvr>
+                                        <p:cTn id="27" dur="500"/>
+                                        <p:tgtEl>
+                                          <p:spTgt spid="6">
+                                            <p:txEl>
+                                              <p:pRg st="7" end="7"/>
+                                            </p:txEl>
+                                          </p:spTgt>
+                                        </p:tgtEl>
+                                      </p:cBhvr>
+                                    </p:animEffect>
+                                  </p:childTnLst>
+                                </p:cTn>
+                              </p:par>
+                              <p:par>
+                                <p:cTn id="28" presetID="10" presetClass="entr" presetSubtype="0" fill="hold" nodeType="withEffect">
+                                  <p:stCondLst>
+                                    <p:cond delay="0"/>
+                                  </p:stCondLst>
+                                  <p:childTnLst>
+                                    <p:set>
+                                      <p:cBhvr>
+                                        <p:cTn id="29" dur="1" fill="hold">
+                                          <p:stCondLst>
+                                            <p:cond delay="0"/>
+                                          </p:stCondLst>
+                                        </p:cTn>
+                                        <p:tgtEl>
+                                          <p:spTgt spid="6">
+                                            <p:txEl>
+                                              <p:pRg st="8" end="8"/>
+                                            </p:txEl>
+                                          </p:spTgt>
+                                        </p:tgtEl>
+                                        <p:attrNameLst>
+                                          <p:attrName>style.visibility</p:attrName>
+                                        </p:attrNameLst>
+                                      </p:cBhvr>
+                                      <p:to>
+                                        <p:strVal val="visible"/>
+                                      </p:to>
+                                    </p:set>
+                                    <p:animEffect transition="in" filter="fade">
+                                      <p:cBhvr>
+                                        <p:cTn id="30" dur="500"/>
+                                        <p:tgtEl>
+                                          <p:spTgt spid="6">
+                                            <p:txEl>
+                                              <p:pRg st="8" end="8"/>
+                                            </p:txEl>
+                                          </p:spTgt>
+                                        </p:tgtEl>
+                                      </p:cBhvr>
+                                    </p:animEffect>
+                                  </p:childTnLst>
+                                </p:cTn>
+                              </p:par>
+                            </p:childTnLst>
+                          </p:cTn>
+                        </p:par>
+                      </p:childTnLst>
+                    </p:cTn>
+                  </p:par>
+                </p:childTnLst>
+              </p:cTn>
+              <p:prevCondLst>
+                <p:cond evt="onPrev" delay="0">
+                  <p:tgtEl>
+                    <p:sldTgt/>
+                  </p:tgtEl>
+                </p:cond>
+              </p:prevCondLst>
+              <p:nextCondLst>
+                <p:cond evt="onNext" delay="0">
+                  <p:tgtEl>
+                    <p:sldTgt/>
+                  </p:tgtEl>
+                </p:cond>
+              </p:nextCondLst>
+            </p:seq>
+          </p:childTnLst>
+        </p:cTn>
+      </p:par>
+    </p:tnLst>
+  </p:timing>
+</p:sld>
+</file>
+
+<file path=ppt/slides/slide3.xml><?xml version="1.0" encoding="utf-8"?>
+<p:sld xmlns:a="http://schemas.openxmlformats.org/drawingml/2006/main" xmlns:r="http://schemas.openxmlformats.org/officeDocument/2006/relationships" xmlns:p="http://schemas.openxmlformats.org/presentationml/2006/main">
+  <p:cSld>
+    <p:bg>
+      <p:bgPr>
+        <a:solidFill>
+          <a:schemeClr val="bg1">
+            <a:alpha val="14000"/>
+          </a:schemeClr>
+        </a:solidFill>
+        <a:effectLst/>
+      </p:bgPr>
+    </p:bg>
+    <p:spTree>
+      <p:nvGrpSpPr>
+        <p:cNvPr id="1" name=""/>
+        <p:cNvGrpSpPr/>
+        <p:nvPr/>
+      </p:nvGrpSpPr>
+      <p:grpSpPr>
+        <a:xfrm>
+          <a:off x="0" y="0"/>
+          <a:ext cx="0" cy="0"/>
+          <a:chOff x="0" y="0"/>
+          <a:chExt cx="0" cy="0"/>
+        </a:xfrm>
+      </p:grpSpPr>
+      <p:pic>
+        <p:nvPicPr>
+          <p:cNvPr id="1026" name="Picture 2" descr="https://i.ytimg.com/vi/e-H3WSXdzPg/maxresdefault.jpg"/>
+          <p:cNvPicPr>
+            <a:picLocks noChangeAspect="1" noChangeArrowheads="1"/>
+          </p:cNvPicPr>
+          <p:nvPr/>
+        </p:nvPicPr>
+        <p:blipFill>
+          <a:blip r:embed="rId3">
+            <a:extLst>
+              <a:ext uri="{28A0092B-C50C-407E-A947-70E740481C1C}">
+                <a14:useLocalDpi xmlns:a14="http://schemas.microsoft.com/office/drawing/2010/main" val="0"/>
+              </a:ext>
+            </a:extLst>
+          </a:blip>
+          <a:srcRect/>
+          <a:stretch>
+            <a:fillRect/>
+          </a:stretch>
+        </p:blipFill>
+        <p:spPr bwMode="auto">
+          <a:xfrm>
+            <a:off x="292589" y="1287613"/>
+            <a:ext cx="8771041" cy="4933711"/>
+          </a:xfrm>
+          <a:prstGeom prst="rect">
+            <a:avLst/>
+          </a:prstGeom>
+          <a:noFill/>
+          <a:extLst>
+            <a:ext uri="{909E8E84-426E-40DD-AFC4-6F175D3DCCD1}">
+              <a14:hiddenFill xmlns:a14="http://schemas.microsoft.com/office/drawing/2010/main">
+                <a:solidFill>
+                  <a:srgbClr val="FFFFFF"/>
+                </a:solidFill>
+              </a14:hiddenFill>
+            </a:ext>
+          </a:extLst>
+        </p:spPr>
+      </p:pic>
+      <p:sp>
+        <p:nvSpPr>
+          <p:cNvPr id="33" name="Text Placeholder 3"/>
+          <p:cNvSpPr>
+            <a:spLocks noGrp="1"/>
+          </p:cNvSpPr>
+          <p:nvPr>
+            <p:ph type="body" sz="quarter" idx="13"/>
+          </p:nvPr>
+        </p:nvSpPr>
+        <p:spPr>
+          <a:xfrm>
+            <a:off x="962025" y="548680"/>
+            <a:ext cx="6516688" cy="424900"/>
+          </a:xfrm>
+        </p:spPr>
+        <p:txBody>
+          <a:bodyPr/>
+          <a:lstStyle/>
+          <a:p>
+            <a:r>
+              <a:rPr lang="nl-NL" dirty="0" smtClean="0">
+                <a:latin typeface="Bebas Neue" panose="020B0000000000000000" pitchFamily="34" charset="0"/>
+              </a:rPr>
+              <a:t>Wat is een </a:t>
+            </a:r>
+            <a:r>
+              <a:rPr lang="nl-NL" dirty="0" err="1" smtClean="0">
+                <a:latin typeface="Bebas Neue" panose="020B0000000000000000" pitchFamily="34" charset="0"/>
+              </a:rPr>
+              <a:t>dojo</a:t>
+            </a:r>
+            <a:r>
+              <a:rPr lang="nl-NL" dirty="0" smtClean="0">
+                <a:latin typeface="Bebas Neue" panose="020B0000000000000000" pitchFamily="34" charset="0"/>
+              </a:rPr>
+              <a:t>?</a:t>
+            </a:r>
+            <a:endParaRPr lang="nl-NL" dirty="0">
+              <a:latin typeface="Bebas Neue" panose="020B0000000000000000" pitchFamily="34" charset="0"/>
+            </a:endParaRPr>
+          </a:p>
+        </p:txBody>
+      </p:sp>
+      <p:sp>
+        <p:nvSpPr>
+          <p:cNvPr id="34" name="Text Placeholder 3"/>
+          <p:cNvSpPr>
+            <a:spLocks noGrp="1"/>
+          </p:cNvSpPr>
+          <p:nvPr>
+            <p:ph type="body" sz="quarter" idx="13"/>
+          </p:nvPr>
+        </p:nvSpPr>
+        <p:spPr>
+          <a:xfrm>
+            <a:off x="962025" y="945887"/>
+            <a:ext cx="6516688" cy="353233"/>
+          </a:xfrm>
+        </p:spPr>
+        <p:txBody>
+          <a:bodyPr/>
+          <a:lstStyle/>
+          <a:p>
+            <a:r>
+              <a:rPr lang="nl-NL" sz="2000" dirty="0" smtClean="0">
+                <a:solidFill>
+                  <a:srgbClr val="A5CD39"/>
+                </a:solidFill>
+                <a:latin typeface="Bebas Neue" panose="020B0000000000000000" pitchFamily="34" charset="0"/>
+              </a:rPr>
+              <a:t>definitie</a:t>
+            </a:r>
+            <a:endParaRPr lang="nl-NL" sz="2000" dirty="0">
+              <a:solidFill>
+                <a:srgbClr val="A5CD39"/>
+              </a:solidFill>
+              <a:latin typeface="Bebas Neue" panose="020B0000000000000000" pitchFamily="34" charset="0"/>
+            </a:endParaRPr>
+          </a:p>
+        </p:txBody>
+      </p:sp>
+      <p:sp>
+        <p:nvSpPr>
+          <p:cNvPr id="6" name="Text Placeholder 2"/>
+          <p:cNvSpPr>
+            <a:spLocks noGrp="1"/>
+          </p:cNvSpPr>
+          <p:nvPr>
+            <p:ph type="body" sz="quarter" idx="12"/>
+          </p:nvPr>
+        </p:nvSpPr>
+        <p:spPr>
+          <a:xfrm>
+            <a:off x="827584" y="1873370"/>
+            <a:ext cx="7858447" cy="4685001"/>
+          </a:xfrm>
+        </p:spPr>
+        <p:txBody>
+          <a:bodyPr/>
+          <a:lstStyle/>
+          <a:p>
+            <a:pPr>
+              <a:lnSpc>
+                <a:spcPct val="100000"/>
+              </a:lnSpc>
+            </a:pPr>
+            <a:r>
+              <a:rPr lang="nl-NL" dirty="0" smtClean="0"/>
+              <a:t>Japans</a:t>
+            </a:r>
+            <a:r>
+              <a:rPr lang="nl-NL" dirty="0" smtClean="0"/>
+              <a:t>: </a:t>
+            </a:r>
+            <a:r>
+              <a:rPr lang="nl-NL" i="1" dirty="0"/>
+              <a:t>de plaats waar men de weg </a:t>
+            </a:r>
+            <a:r>
+              <a:rPr lang="nl-NL" i="1" dirty="0" smtClean="0"/>
+              <a:t>leert</a:t>
+            </a:r>
+          </a:p>
+          <a:p>
+            <a:pPr>
+              <a:lnSpc>
+                <a:spcPct val="100000"/>
+              </a:lnSpc>
+            </a:pPr>
+            <a:endParaRPr lang="nl-NL" dirty="0" smtClean="0"/>
+          </a:p>
+          <a:p>
+            <a:pPr>
+              <a:lnSpc>
+                <a:spcPct val="100000"/>
+              </a:lnSpc>
+            </a:pPr>
+            <a:r>
+              <a:rPr lang="nl-NL" dirty="0" smtClean="0"/>
+              <a:t>Oefenruimte</a:t>
+            </a:r>
+          </a:p>
+          <a:p>
+            <a:pPr>
+              <a:lnSpc>
+                <a:spcPct val="100000"/>
+              </a:lnSpc>
+            </a:pPr>
+            <a:endParaRPr lang="nl-NL" dirty="0" smtClean="0"/>
+          </a:p>
+          <a:p>
+            <a:pPr>
+              <a:lnSpc>
+                <a:spcPct val="100000"/>
+              </a:lnSpc>
+            </a:pPr>
+            <a:r>
+              <a:rPr lang="nl-NL" dirty="0" smtClean="0"/>
+              <a:t>Trainingsplaats </a:t>
+            </a:r>
+            <a:r>
+              <a:rPr lang="nl-NL" dirty="0"/>
+              <a:t>Voor </a:t>
+            </a:r>
+            <a:r>
+              <a:rPr lang="nl-NL" dirty="0" smtClean="0"/>
+              <a:t>Krijgskunsten</a:t>
+            </a:r>
+          </a:p>
+          <a:p>
+            <a:pPr>
+              <a:lnSpc>
+                <a:spcPct val="100000"/>
+              </a:lnSpc>
+            </a:pPr>
+            <a:endParaRPr lang="nl-NL" sz="1800" dirty="0" smtClean="0"/>
+          </a:p>
+          <a:p>
+            <a:pPr>
+              <a:lnSpc>
+                <a:spcPct val="100000"/>
+              </a:lnSpc>
+            </a:pPr>
+            <a:endParaRPr lang="nl-NL" sz="1800" dirty="0"/>
+          </a:p>
+          <a:p>
+            <a:pPr marL="0" indent="0">
+              <a:lnSpc>
+                <a:spcPct val="100000"/>
+              </a:lnSpc>
+              <a:buNone/>
+            </a:pPr>
+            <a:endParaRPr lang="nl-NL" sz="1800" dirty="0" smtClean="0"/>
+          </a:p>
+          <a:p>
+            <a:pPr marL="0" indent="0">
+              <a:lnSpc>
+                <a:spcPct val="100000"/>
+              </a:lnSpc>
+              <a:buNone/>
+            </a:pPr>
+            <a:endParaRPr lang="nl-NL" sz="1800" dirty="0"/>
+          </a:p>
+        </p:txBody>
+      </p:sp>
+    </p:spTree>
+    <p:extLst>
+      <p:ext uri="{BB962C8B-B14F-4D97-AF65-F5344CB8AC3E}">
+        <p14:creationId xmlns:p14="http://schemas.microsoft.com/office/powerpoint/2010/main" val="3989856801"/>
+      </p:ext>
+    </p:extLst>
+  </p:cSld>
+  <p:clrMapOvr>
+    <a:masterClrMapping/>
+  </p:clrMapOvr>
+  <mc:AlternateContent xmlns:mc="http://schemas.openxmlformats.org/markup-compatibility/2006">
+    <mc:Choice xmlns:p14="http://schemas.microsoft.com/office/powerpoint/2010/main" Requires="p14">
+      <p:transition p14:dur="10"/>
+    </mc:Choice>
+    <mc:Fallback>
+      <p:transition/>
+    </mc:Fallback>
+  </mc:AlternateContent>
+  <p:timing>
+    <p:tnLst>
+      <p:par>
+        <p:cTn id="1" dur="indefinite" restart="never" nodeType="tmRoot">
+          <p:childTnLst>
+            <p:seq concurrent="1" nextAc="seek">
+              <p:cTn id="2" dur="indefinite" nodeType="mainSeq">
+                <p:childTnLst>
+                  <p:par>
+                    <p:cTn id="3" fill="hold">
+                      <p:stCondLst>
+                        <p:cond delay="indefinite"/>
+                      </p:stCondLst>
+                      <p:childTnLst>
+                        <p:par>
+                          <p:cTn id="4" fill="hold">
+                            <p:stCondLst>
+                              <p:cond delay="0"/>
+                            </p:stCondLst>
+                            <p:childTnLst>
+                              <p:par>
+                                <p:cTn id="5" presetID="9" presetClass="emph" presetSubtype="0" nodeType="clickEffect">
+                                  <p:stCondLst>
+                                    <p:cond delay="100"/>
+                                  </p:stCondLst>
+                                  <p:childTnLst>
+                                    <p:set>
+                                      <p:cBhvr rctx="PPT">
+                                        <p:cTn id="6" dur="indefinite"/>
+                                        <p:tgtEl>
+                                          <p:spTgt spid="1026"/>
+                                        </p:tgtEl>
+                                        <p:attrNameLst>
+                                          <p:attrName>style.opacity</p:attrName>
+                                        </p:attrNameLst>
+                                      </p:cBhvr>
+                                      <p:to>
+                                        <p:strVal val="0.25"/>
+                                      </p:to>
+                                    </p:set>
+                                    <p:animEffect filter="image" prLst="opacity: 0.25">
+                                      <p:cBhvr rctx="IE">
+                                        <p:cTn id="7" dur="indefinite"/>
+                                        <p:tgtEl>
+                                          <p:spTgt spid="1026"/>
                                         </p:tgtEl>
                                       </p:cBhvr>
                                     </p:animEffect>
@@ -6818,7 +7329,7 @@
                             </p:stCondLst>
                             <p:childTnLst>
                               <p:par>
-                                <p:cTn id="10" presetID="22" presetClass="entr" presetSubtype="4" fill="hold" nodeType="clickEffect">
+                                <p:cTn id="10" presetID="10" presetClass="entr" presetSubtype="0" fill="hold" nodeType="clickEffect">
                                   <p:stCondLst>
                                     <p:cond delay="0"/>
                                   </p:stCondLst>
@@ -6833,7 +7344,7 @@
                                         <p:tgtEl>
                                           <p:spTgt spid="6">
                                             <p:txEl>
-                                              <p:pRg st="1" end="1"/>
+                                              <p:pRg st="0" end="0"/>
                                             </p:txEl>
                                           </p:spTgt>
                                         </p:tgtEl>
@@ -6845,13 +7356,13 @@
                                         <p:strVal val="visible"/>
                                       </p:to>
                                     </p:set>
-                                    <p:animEffect transition="in" filter="wipe(down)">
+                                    <p:animEffect transition="in" filter="fade">
                                       <p:cBhvr>
                                         <p:cTn id="12" dur="500"/>
                                         <p:tgtEl>
                                           <p:spTgt spid="6">
                                             <p:txEl>
-                                              <p:pRg st="1" end="1"/>
+                                              <p:pRg st="0" end="0"/>
                                             </p:txEl>
                                           </p:spTgt>
                                         </p:tgtEl>
@@ -6879,7 +7390,7 @@
                             </p:stCondLst>
                             <p:childTnLst>
                               <p:par>
-                                <p:cTn id="15" presetID="22" presetClass="entr" presetSubtype="4" fill="hold" nodeType="clickEffect">
+                                <p:cTn id="15" presetID="10" presetClass="entr" presetSubtype="0" fill="hold" nodeType="clickEffect">
                                   <p:stCondLst>
                                     <p:cond delay="0"/>
                                   </p:stCondLst>
@@ -6894,7 +7405,7 @@
                                         <p:tgtEl>
                                           <p:spTgt spid="6">
                                             <p:txEl>
-                                              <p:pRg st="3" end="3"/>
+                                              <p:pRg st="2" end="2"/>
                                             </p:txEl>
                                           </p:spTgt>
                                         </p:tgtEl>
@@ -6906,13 +7417,13 @@
                                         <p:strVal val="visible"/>
                                       </p:to>
                                     </p:set>
-                                    <p:animEffect transition="in" filter="wipe(down)">
+                                    <p:animEffect transition="in" filter="fade">
                                       <p:cBhvr>
                                         <p:cTn id="17" dur="500"/>
                                         <p:tgtEl>
                                           <p:spTgt spid="6">
                                             <p:txEl>
-                                              <p:pRg st="3" end="3"/>
+                                              <p:pRg st="2" end="2"/>
                                             </p:txEl>
                                           </p:spTgt>
                                         </p:tgtEl>
@@ -6940,7 +7451,7 @@
                             </p:stCondLst>
                             <p:childTnLst>
                               <p:par>
-                                <p:cTn id="20" presetID="22" presetClass="entr" presetSubtype="4" fill="hold" nodeType="clickEffect">
+                                <p:cTn id="20" presetID="10" presetClass="entr" presetSubtype="0" fill="hold" nodeType="clickEffect">
                                   <p:stCondLst>
                                     <p:cond delay="0"/>
                                   </p:stCondLst>
@@ -6955,7 +7466,7 @@
                                         <p:tgtEl>
                                           <p:spTgt spid="6">
                                             <p:txEl>
-                                              <p:pRg st="5" end="5"/>
+                                              <p:pRg st="4" end="4"/>
                                             </p:txEl>
                                           </p:spTgt>
                                         </p:tgtEl>
@@ -6967,13 +7478,13 @@
                                         <p:strVal val="visible"/>
                                       </p:to>
                                     </p:set>
-                                    <p:animEffect transition="in" filter="wipe(down)">
+                                    <p:animEffect transition="in" filter="fade">
                                       <p:cBhvr>
                                         <p:cTn id="22" dur="500"/>
                                         <p:tgtEl>
                                           <p:spTgt spid="6">
                                             <p:txEl>
-                                              <p:pRg st="5" end="5"/>
+                                              <p:pRg st="4" end="4"/>
                                             </p:txEl>
                                           </p:spTgt>
                                         </p:tgtEl>
@@ -7030,6 +7541,47 @@
           <a:chExt cx="0" cy="0"/>
         </a:xfrm>
       </p:grpSpPr>
+      <p:pic>
+        <p:nvPicPr>
+          <p:cNvPr id="2050" name="Picture 2" descr="http://leedscodedojo.github.io/images/event/event1.jpg"/>
+          <p:cNvPicPr>
+            <a:picLocks noChangeAspect="1" noChangeArrowheads="1"/>
+          </p:cNvPicPr>
+          <p:nvPr/>
+        </p:nvPicPr>
+        <p:blipFill>
+          <a:blip r:embed="rId3">
+            <a:extLst>
+              <a:ext uri="{28A0092B-C50C-407E-A947-70E740481C1C}">
+                <a14:useLocalDpi xmlns:a14="http://schemas.microsoft.com/office/drawing/2010/main" val="0"/>
+              </a:ext>
+            </a:extLst>
+          </a:blip>
+          <a:srcRect/>
+          <a:stretch>
+            <a:fillRect/>
+          </a:stretch>
+        </p:blipFill>
+        <p:spPr bwMode="auto">
+          <a:xfrm>
+            <a:off x="827584" y="1396148"/>
+            <a:ext cx="7900084" cy="4625140"/>
+          </a:xfrm>
+          <a:prstGeom prst="rect">
+            <a:avLst/>
+          </a:prstGeom>
+          <a:noFill/>
+          <a:extLst>
+            <a:ext uri="{909E8E84-426E-40DD-AFC4-6F175D3DCCD1}">
+              <a14:hiddenFill xmlns:a14="http://schemas.microsoft.com/office/drawing/2010/main">
+                <a:solidFill>
+                  <a:srgbClr val="FFFFFF"/>
+                </a:solidFill>
+              </a14:hiddenFill>
+            </a:ext>
+          </a:extLst>
+        </p:spPr>
+      </p:pic>
       <p:sp>
         <p:nvSpPr>
           <p:cNvPr id="33" name="Text Placeholder 3"/>
@@ -7054,10 +7606,13 @@
               <a:rPr lang="nl-NL" dirty="0" smtClean="0">
                 <a:latin typeface="Bebas Neue" panose="020B0000000000000000" pitchFamily="34" charset="0"/>
               </a:rPr>
-              <a:t>Wat is een (</a:t>
+              <a:t>Wat is een </a:t>
             </a:r>
             <a:r>
               <a:rPr lang="nl-NL" dirty="0" err="1" smtClean="0">
+                <a:solidFill>
+                  <a:srgbClr val="A5CD39"/>
+                </a:solidFill>
                 <a:latin typeface="Bebas Neue" panose="020B0000000000000000" pitchFamily="34" charset="0"/>
               </a:rPr>
               <a:t>coding</a:t>
@@ -7066,7 +7621,7 @@
               <a:rPr lang="nl-NL" dirty="0" smtClean="0">
                 <a:latin typeface="Bebas Neue" panose="020B0000000000000000" pitchFamily="34" charset="0"/>
               </a:rPr>
-              <a:t>) </a:t>
+              <a:t> </a:t>
             </a:r>
             <a:r>
               <a:rPr lang="nl-NL" dirty="0" err="1" smtClean="0">
@@ -7144,58 +7699,6 @@
           <a:bodyPr/>
           <a:lstStyle/>
           <a:p>
-            <a:pPr marL="0" indent="0">
-              <a:lnSpc>
-                <a:spcPct val="100000"/>
-              </a:lnSpc>
-              <a:buNone/>
-            </a:pPr>
-            <a:r>
-              <a:rPr lang="nl-NL" sz="2800" dirty="0" smtClean="0"/>
-              <a:t>Wat is </a:t>
-            </a:r>
-            <a:r>
-              <a:rPr lang="nl-NL" sz="2800" dirty="0" err="1" smtClean="0"/>
-              <a:t>Coding</a:t>
-            </a:r>
-            <a:r>
-              <a:rPr lang="nl-NL" sz="2800" dirty="0" smtClean="0"/>
-              <a:t> </a:t>
-            </a:r>
-            <a:r>
-              <a:rPr lang="nl-NL" sz="2800" dirty="0" err="1" smtClean="0"/>
-              <a:t>Dojo</a:t>
-            </a:r>
-            <a:r>
-              <a:rPr lang="nl-NL" sz="2800" dirty="0" smtClean="0"/>
-              <a:t>:</a:t>
-            </a:r>
-            <a:endParaRPr lang="nl-NL" sz="1800" dirty="0" smtClean="0"/>
-          </a:p>
-          <a:p>
-            <a:pPr>
-              <a:lnSpc>
-                <a:spcPct val="100000"/>
-              </a:lnSpc>
-            </a:pPr>
-            <a:r>
-              <a:rPr lang="nl-NL" sz="2800" dirty="0" smtClean="0"/>
-              <a:t>een </a:t>
-            </a:r>
-            <a:r>
-              <a:rPr lang="nl-NL" sz="2800" dirty="0"/>
-              <a:t>trainingsplaats voor </a:t>
-            </a:r>
-            <a:r>
-              <a:rPr lang="nl-NL" sz="2800" dirty="0" err="1"/>
-              <a:t>developers</a:t>
-            </a:r>
-            <a:r>
-              <a:rPr lang="nl-NL" sz="2800" dirty="0" smtClean="0"/>
-              <a:t>.</a:t>
-            </a:r>
-          </a:p>
-          <a:p>
             <a:pPr>
               <a:lnSpc>
                 <a:spcPct val="100000"/>
@@ -7211,6 +7714,37 @@
             </a:pPr>
             <a:r>
               <a:rPr lang="nl-NL" sz="2800" dirty="0" smtClean="0"/>
+              <a:t>een </a:t>
+            </a:r>
+            <a:r>
+              <a:rPr lang="nl-NL" sz="2800" dirty="0"/>
+              <a:t>trainingsplaats voor </a:t>
+            </a:r>
+            <a:r>
+              <a:rPr lang="nl-NL" sz="2800" dirty="0" err="1"/>
+              <a:t>developers</a:t>
+            </a:r>
+            <a:r>
+              <a:rPr lang="nl-NL" sz="2800" dirty="0" smtClean="0"/>
+              <a:t>.</a:t>
+            </a:r>
+          </a:p>
+          <a:p>
+            <a:pPr>
+              <a:lnSpc>
+                <a:spcPct val="100000"/>
+              </a:lnSpc>
+            </a:pPr>
+            <a:endParaRPr lang="nl-NL" sz="2800" dirty="0" smtClean="0"/>
+          </a:p>
+          <a:p>
+            <a:pPr>
+              <a:lnSpc>
+                <a:spcPct val="100000"/>
+              </a:lnSpc>
+            </a:pPr>
+            <a:r>
+              <a:rPr lang="nl-NL" sz="2800" dirty="0" smtClean="0"/>
               <a:t>Een plek om nieuwe dingen te leren en te trainen</a:t>
             </a:r>
           </a:p>
@@ -7240,7 +7774,6 @@
               <a:rPr lang="nl-NL" sz="2800" dirty="0" smtClean="0"/>
               <a:t>) skills te verbeteren</a:t>
             </a:r>
-            <a:endParaRPr lang="nl-NL" sz="2800" dirty="0" smtClean="0"/>
           </a:p>
           <a:p>
             <a:pPr>
@@ -7301,42 +7834,30 @@
                             </p:stCondLst>
                             <p:childTnLst>
                               <p:par>
-                                <p:cTn id="5" presetID="22" presetClass="entr" presetSubtype="4" fill="hold" nodeType="clickEffect">
+                                <p:cTn id="5" presetID="9" presetClass="emph" presetSubtype="0" nodeType="clickEffect">
                                   <p:stCondLst>
                                     <p:cond delay="0"/>
                                   </p:stCondLst>
                                   <p:childTnLst>
                                     <p:set>
-                                      <p:cBhvr>
-                                        <p:cTn id="6" dur="1" fill="hold">
-                                          <p:stCondLst>
-                                            <p:cond delay="0"/>
-                                          </p:stCondLst>
-                                        </p:cTn>
+                                      <p:cBhvr rctx="PPT">
+                                        <p:cTn id="6" dur="indefinite"/>
                                         <p:tgtEl>
-                                          <p:spTgt spid="6">
-                                            <p:txEl>
-                                              <p:pRg st="0" end="0"/>
-                                            </p:txEl>
-                                          </p:spTgt>
+                                          <p:spTgt spid="2050"/>
                                         </p:tgtEl>
                                         <p:attrNameLst>
-                                          <p:attrName>style.visibility</p:attrName>
+                                          <p:attrName>style.opacity</p:attrName>
                                         </p:attrNameLst>
                                       </p:cBhvr>
                                       <p:to>
-                                        <p:strVal val="visible"/>
+                                        <p:strVal val="0.25"/>
                                       </p:to>
                                     </p:set>
-                                    <p:animEffect transition="in" filter="wipe(down)">
-                                      <p:cBhvr>
-                                        <p:cTn id="7" dur="500"/>
+                                    <p:animEffect filter="image" prLst="opacity: 0.25">
+                                      <p:cBhvr rctx="IE">
+                                        <p:cTn id="7" dur="indefinite"/>
                                         <p:tgtEl>
-                                          <p:spTgt spid="6">
-                                            <p:txEl>
-                                              <p:pRg st="0" end="0"/>
-                                            </p:txEl>
-                                          </p:spTgt>
+                                          <p:spTgt spid="2050"/>
                                         </p:tgtEl>
                                       </p:cBhvr>
                                     </p:animEffect>
@@ -7715,36 +8236,6 @@
           </a:p>
         </p:txBody>
       </p:sp>
-      <p:pic>
-        <p:nvPicPr>
-          <p:cNvPr id="2" name="Picture 1"/>
-          <p:cNvPicPr>
-            <a:picLocks noChangeAspect="1"/>
-          </p:cNvPicPr>
-          <p:nvPr/>
-        </p:nvPicPr>
-        <p:blipFill>
-          <a:blip r:embed="rId3">
-            <a:extLst>
-              <a:ext uri="{28A0092B-C50C-407E-A947-70E740481C1C}">
-                <a14:useLocalDpi xmlns:a14="http://schemas.microsoft.com/office/drawing/2010/main" val="0"/>
-              </a:ext>
-            </a:extLst>
-          </a:blip>
-          <a:stretch>
-            <a:fillRect/>
-          </a:stretch>
-        </p:blipFill>
-        <p:spPr>
-          <a:xfrm>
-            <a:off x="954792" y="973580"/>
-            <a:ext cx="7597116" cy="4578152"/>
-          </a:xfrm>
-          <a:prstGeom prst="rect">
-            <a:avLst/>
-          </a:prstGeom>
-        </p:spPr>
-      </p:pic>
       <p:sp>
         <p:nvSpPr>
           <p:cNvPr id="3" name="TextBox 2"/>
@@ -7797,6 +8288,100 @@
           </a:p>
         </p:txBody>
       </p:sp>
+      <p:pic>
+        <p:nvPicPr>
+          <p:cNvPr id="4" name="Picture 3"/>
+          <p:cNvPicPr>
+            <a:picLocks noChangeAspect="1"/>
+          </p:cNvPicPr>
+          <p:nvPr/>
+        </p:nvPicPr>
+        <p:blipFill>
+          <a:blip r:embed="rId3"/>
+          <a:stretch>
+            <a:fillRect/>
+          </a:stretch>
+        </p:blipFill>
+        <p:spPr>
+          <a:xfrm>
+            <a:off x="586286" y="44624"/>
+            <a:ext cx="8228732" cy="5728967"/>
+          </a:xfrm>
+          <a:prstGeom prst="rect">
+            <a:avLst/>
+          </a:prstGeom>
+        </p:spPr>
+      </p:pic>
+      <p:cxnSp>
+        <p:nvCxnSpPr>
+          <p:cNvPr id="8" name="Straight Connector 7"/>
+          <p:cNvCxnSpPr/>
+          <p:nvPr/>
+        </p:nvCxnSpPr>
+        <p:spPr>
+          <a:xfrm flipV="1">
+            <a:off x="683568" y="260648"/>
+            <a:ext cx="7848872" cy="5421068"/>
+          </a:xfrm>
+          <a:prstGeom prst="line">
+            <a:avLst/>
+          </a:prstGeom>
+          <a:ln w="203200">
+            <a:solidFill>
+              <a:srgbClr val="FF0000"/>
+            </a:solidFill>
+          </a:ln>
+        </p:spPr>
+        <p:style>
+          <a:lnRef idx="2">
+            <a:schemeClr val="accent2"/>
+          </a:lnRef>
+          <a:fillRef idx="0">
+            <a:schemeClr val="accent2"/>
+          </a:fillRef>
+          <a:effectRef idx="1">
+            <a:schemeClr val="accent2"/>
+          </a:effectRef>
+          <a:fontRef idx="minor">
+            <a:schemeClr val="tx1"/>
+          </a:fontRef>
+        </p:style>
+      </p:cxnSp>
+      <p:cxnSp>
+        <p:nvCxnSpPr>
+          <p:cNvPr id="12" name="Straight Connector 11"/>
+          <p:cNvCxnSpPr/>
+          <p:nvPr/>
+        </p:nvCxnSpPr>
+        <p:spPr>
+          <a:xfrm>
+            <a:off x="835968" y="260648"/>
+            <a:ext cx="7848872" cy="5328592"/>
+          </a:xfrm>
+          <a:prstGeom prst="line">
+            <a:avLst/>
+          </a:prstGeom>
+          <a:ln w="203200">
+            <a:solidFill>
+              <a:srgbClr val="FF0000"/>
+            </a:solidFill>
+          </a:ln>
+        </p:spPr>
+        <p:style>
+          <a:lnRef idx="2">
+            <a:schemeClr val="accent2"/>
+          </a:lnRef>
+          <a:fillRef idx="0">
+            <a:schemeClr val="accent2"/>
+          </a:fillRef>
+          <a:effectRef idx="1">
+            <a:schemeClr val="accent2"/>
+          </a:effectRef>
+          <a:fontRef idx="minor">
+            <a:schemeClr val="tx1"/>
+          </a:fontRef>
+        </p:style>
+      </p:cxnSp>
     </p:spTree>
     <p:extLst>
       <p:ext uri="{BB962C8B-B14F-4D97-AF65-F5344CB8AC3E}">
@@ -7810,7 +8395,283 @@
   <p:timing>
     <p:tnLst>
       <p:par>
-        <p:cTn id="1" dur="indefinite" restart="never" nodeType="tmRoot"/>
+        <p:cTn id="1" dur="indefinite" restart="never" nodeType="tmRoot">
+          <p:childTnLst>
+            <p:seq concurrent="1" nextAc="seek">
+              <p:cTn id="2" dur="indefinite" nodeType="mainSeq">
+                <p:childTnLst>
+                  <p:par>
+                    <p:cTn id="3" fill="hold">
+                      <p:stCondLst>
+                        <p:cond delay="indefinite"/>
+                        <p:cond evt="onBegin" delay="0">
+                          <p:tn val="2"/>
+                        </p:cond>
+                      </p:stCondLst>
+                      <p:childTnLst>
+                        <p:par>
+                          <p:cTn id="4" fill="hold">
+                            <p:stCondLst>
+                              <p:cond delay="0"/>
+                            </p:stCondLst>
+                            <p:childTnLst>
+                              <p:par>
+                                <p:cTn id="5" presetID="53" presetClass="entr" presetSubtype="16" fill="hold" nodeType="afterEffect">
+                                  <p:stCondLst>
+                                    <p:cond delay="1000"/>
+                                  </p:stCondLst>
+                                  <p:childTnLst>
+                                    <p:set>
+                                      <p:cBhvr>
+                                        <p:cTn id="6" dur="1" fill="hold">
+                                          <p:stCondLst>
+                                            <p:cond delay="0"/>
+                                          </p:stCondLst>
+                                        </p:cTn>
+                                        <p:tgtEl>
+                                          <p:spTgt spid="12"/>
+                                        </p:tgtEl>
+                                        <p:attrNameLst>
+                                          <p:attrName>style.visibility</p:attrName>
+                                        </p:attrNameLst>
+                                      </p:cBhvr>
+                                      <p:to>
+                                        <p:strVal val="visible"/>
+                                      </p:to>
+                                    </p:set>
+                                    <p:anim calcmode="lin" valueType="num">
+                                      <p:cBhvr>
+                                        <p:cTn id="7" dur="500" fill="hold"/>
+                                        <p:tgtEl>
+                                          <p:spTgt spid="12"/>
+                                        </p:tgtEl>
+                                        <p:attrNameLst>
+                                          <p:attrName>ppt_w</p:attrName>
+                                        </p:attrNameLst>
+                                      </p:cBhvr>
+                                      <p:tavLst>
+                                        <p:tav tm="0">
+                                          <p:val>
+                                            <p:fltVal val="0"/>
+                                          </p:val>
+                                        </p:tav>
+                                        <p:tav tm="100000">
+                                          <p:val>
+                                            <p:strVal val="#ppt_w"/>
+                                          </p:val>
+                                        </p:tav>
+                                      </p:tavLst>
+                                    </p:anim>
+                                    <p:anim calcmode="lin" valueType="num">
+                                      <p:cBhvr>
+                                        <p:cTn id="8" dur="500" fill="hold"/>
+                                        <p:tgtEl>
+                                          <p:spTgt spid="12"/>
+                                        </p:tgtEl>
+                                        <p:attrNameLst>
+                                          <p:attrName>ppt_h</p:attrName>
+                                        </p:attrNameLst>
+                                      </p:cBhvr>
+                                      <p:tavLst>
+                                        <p:tav tm="0">
+                                          <p:val>
+                                            <p:fltVal val="0"/>
+                                          </p:val>
+                                        </p:tav>
+                                        <p:tav tm="100000">
+                                          <p:val>
+                                            <p:strVal val="#ppt_h"/>
+                                          </p:val>
+                                        </p:tav>
+                                      </p:tavLst>
+                                    </p:anim>
+                                    <p:animEffect transition="in" filter="fade">
+                                      <p:cBhvr>
+                                        <p:cTn id="9" dur="500"/>
+                                        <p:tgtEl>
+                                          <p:spTgt spid="12"/>
+                                        </p:tgtEl>
+                                      </p:cBhvr>
+                                    </p:animEffect>
+                                  </p:childTnLst>
+                                </p:cTn>
+                              </p:par>
+                            </p:childTnLst>
+                          </p:cTn>
+                        </p:par>
+                        <p:par>
+                          <p:cTn id="10" fill="hold">
+                            <p:stCondLst>
+                              <p:cond delay="1500"/>
+                            </p:stCondLst>
+                            <p:childTnLst>
+                              <p:par>
+                                <p:cTn id="11" presetID="53" presetClass="entr" presetSubtype="16" fill="hold" nodeType="afterEffect">
+                                  <p:stCondLst>
+                                    <p:cond delay="0"/>
+                                  </p:stCondLst>
+                                  <p:childTnLst>
+                                    <p:set>
+                                      <p:cBhvr>
+                                        <p:cTn id="12" dur="1" fill="hold">
+                                          <p:stCondLst>
+                                            <p:cond delay="0"/>
+                                          </p:stCondLst>
+                                        </p:cTn>
+                                        <p:tgtEl>
+                                          <p:spTgt spid="8"/>
+                                        </p:tgtEl>
+                                        <p:attrNameLst>
+                                          <p:attrName>style.visibility</p:attrName>
+                                        </p:attrNameLst>
+                                      </p:cBhvr>
+                                      <p:to>
+                                        <p:strVal val="visible"/>
+                                      </p:to>
+                                    </p:set>
+                                    <p:anim calcmode="lin" valueType="num">
+                                      <p:cBhvr>
+                                        <p:cTn id="13" dur="500" fill="hold"/>
+                                        <p:tgtEl>
+                                          <p:spTgt spid="8"/>
+                                        </p:tgtEl>
+                                        <p:attrNameLst>
+                                          <p:attrName>ppt_w</p:attrName>
+                                        </p:attrNameLst>
+                                      </p:cBhvr>
+                                      <p:tavLst>
+                                        <p:tav tm="0">
+                                          <p:val>
+                                            <p:fltVal val="0"/>
+                                          </p:val>
+                                        </p:tav>
+                                        <p:tav tm="100000">
+                                          <p:val>
+                                            <p:strVal val="#ppt_w"/>
+                                          </p:val>
+                                        </p:tav>
+                                      </p:tavLst>
+                                    </p:anim>
+                                    <p:anim calcmode="lin" valueType="num">
+                                      <p:cBhvr>
+                                        <p:cTn id="14" dur="500" fill="hold"/>
+                                        <p:tgtEl>
+                                          <p:spTgt spid="8"/>
+                                        </p:tgtEl>
+                                        <p:attrNameLst>
+                                          <p:attrName>ppt_h</p:attrName>
+                                        </p:attrNameLst>
+                                      </p:cBhvr>
+                                      <p:tavLst>
+                                        <p:tav tm="0">
+                                          <p:val>
+                                            <p:fltVal val="0"/>
+                                          </p:val>
+                                        </p:tav>
+                                        <p:tav tm="100000">
+                                          <p:val>
+                                            <p:strVal val="#ppt_h"/>
+                                          </p:val>
+                                        </p:tav>
+                                      </p:tavLst>
+                                    </p:anim>
+                                    <p:animEffect transition="in" filter="fade">
+                                      <p:cBhvr>
+                                        <p:cTn id="15" dur="500"/>
+                                        <p:tgtEl>
+                                          <p:spTgt spid="8"/>
+                                        </p:tgtEl>
+                                      </p:cBhvr>
+                                    </p:animEffect>
+                                  </p:childTnLst>
+                                </p:cTn>
+                              </p:par>
+                            </p:childTnLst>
+                          </p:cTn>
+                        </p:par>
+                      </p:childTnLst>
+                    </p:cTn>
+                  </p:par>
+                  <p:par>
+                    <p:cTn id="16" fill="hold">
+                      <p:stCondLst>
+                        <p:cond delay="indefinite"/>
+                      </p:stCondLst>
+                      <p:childTnLst>
+                        <p:par>
+                          <p:cTn id="17" fill="hold">
+                            <p:stCondLst>
+                              <p:cond delay="0"/>
+                            </p:stCondLst>
+                            <p:childTnLst>
+                              <p:par>
+                                <p:cTn id="18" presetID="10" presetClass="entr" presetSubtype="0" fill="hold" nodeType="clickEffect">
+                                  <p:stCondLst>
+                                    <p:cond delay="0"/>
+                                  </p:stCondLst>
+                                  <p:childTnLst>
+                                    <p:set>
+                                      <p:cBhvr>
+                                        <p:cTn id="19" dur="1" fill="hold">
+                                          <p:stCondLst>
+                                            <p:cond delay="0"/>
+                                          </p:stCondLst>
+                                        </p:cTn>
+                                        <p:tgtEl>
+                                          <p:spTgt spid="3">
+                                            <p:txEl>
+                                              <p:pRg st="0" end="0"/>
+                                            </p:txEl>
+                                          </p:spTgt>
+                                        </p:tgtEl>
+                                        <p:attrNameLst>
+                                          <p:attrName>style.visibility</p:attrName>
+                                        </p:attrNameLst>
+                                      </p:cBhvr>
+                                      <p:to>
+                                        <p:strVal val="visible"/>
+                                      </p:to>
+                                    </p:set>
+                                    <p:animEffect transition="in" filter="fade">
+                                      <p:cBhvr>
+                                        <p:cTn id="20" dur="500"/>
+                                        <p:tgtEl>
+                                          <p:spTgt spid="3">
+                                            <p:txEl>
+                                              <p:pRg st="0" end="0"/>
+                                            </p:txEl>
+                                          </p:spTgt>
+                                        </p:tgtEl>
+                                      </p:cBhvr>
+                                    </p:animEffect>
+                                  </p:childTnLst>
+                                </p:cTn>
+                              </p:par>
+                            </p:childTnLst>
+                          </p:cTn>
+                        </p:par>
+                      </p:childTnLst>
+                    </p:cTn>
+                  </p:par>
+                </p:childTnLst>
+              </p:cTn>
+              <p:prevCondLst>
+                <p:cond evt="onPrev" delay="0">
+                  <p:tgtEl>
+                    <p:sldTgt/>
+                  </p:tgtEl>
+                </p:cond>
+              </p:prevCondLst>
+              <p:nextCondLst>
+                <p:cond evt="onNext" delay="0">
+                  <p:tgtEl>
+                    <p:sldTgt/>
+                  </p:tgtEl>
+                </p:cond>
+              </p:nextCondLst>
+            </p:seq>
+          </p:childTnLst>
+        </p:cTn>
       </p:par>
     </p:tnLst>
   </p:timing>
@@ -7858,19 +8719,7 @@
               <a:rPr lang="nl-NL" dirty="0" smtClean="0">
                 <a:latin typeface="Bebas Neue" panose="020B0000000000000000" pitchFamily="34" charset="0"/>
               </a:rPr>
-              <a:t>Wat is een (</a:t>
-            </a:r>
-            <a:r>
-              <a:rPr lang="nl-NL" dirty="0" err="1" smtClean="0">
-                <a:latin typeface="Bebas Neue" panose="020B0000000000000000" pitchFamily="34" charset="0"/>
-              </a:rPr>
-              <a:t>coding</a:t>
-            </a:r>
-            <a:r>
-              <a:rPr lang="nl-NL" dirty="0" smtClean="0">
-                <a:latin typeface="Bebas Neue" panose="020B0000000000000000" pitchFamily="34" charset="0"/>
-              </a:rPr>
-              <a:t>) </a:t>
+              <a:t>Wat is een </a:t>
             </a:r>
             <a:r>
               <a:rPr lang="nl-NL" dirty="0" err="1" smtClean="0">
@@ -7955,16 +8804,46 @@
               <a:buNone/>
             </a:pPr>
             <a:r>
+              <a:rPr lang="nl-NL" dirty="0" smtClean="0"/>
+              <a:t>Een </a:t>
+            </a:r>
+            <a:r>
+              <a:rPr lang="nl-NL" dirty="0"/>
+              <a:t>individuele stijloefening met een reeks vastgelegde </a:t>
+            </a:r>
+            <a:r>
+              <a:rPr lang="nl-NL" dirty="0" smtClean="0"/>
+              <a:t>bewegingen</a:t>
+            </a:r>
+          </a:p>
+          <a:p>
+            <a:pPr marL="0" indent="0">
+              <a:lnSpc>
+                <a:spcPct val="100000"/>
+              </a:lnSpc>
+              <a:buNone/>
+            </a:pPr>
+            <a:endParaRPr lang="nl-NL" sz="1800" dirty="0" smtClean="0"/>
+          </a:p>
+          <a:p>
+            <a:pPr marL="0" indent="0">
+              <a:lnSpc>
+                <a:spcPct val="100000"/>
+              </a:lnSpc>
+              <a:buNone/>
+            </a:pPr>
+            <a:endParaRPr lang="nl-NL" sz="1800" dirty="0"/>
+          </a:p>
+          <a:p>
+            <a:pPr marL="0" indent="0">
+              <a:lnSpc>
+                <a:spcPct val="100000"/>
+              </a:lnSpc>
+              <a:buNone/>
+            </a:pPr>
+            <a:r>
               <a:rPr lang="nl-NL" sz="2800" dirty="0" smtClean="0"/>
-              <a:t>Wat is een </a:t>
-            </a:r>
-            <a:r>
-              <a:rPr lang="nl-NL" sz="2800" dirty="0" err="1" smtClean="0"/>
-              <a:t>Kata</a:t>
-            </a:r>
-            <a:r>
-              <a:rPr lang="nl-NL" sz="2800" dirty="0" smtClean="0"/>
-              <a:t>?</a:t>
+              <a:t>Doel: </a:t>
             </a:r>
           </a:p>
           <a:p>
@@ -7974,46 +8853,20 @@
               </a:lnSpc>
             </a:pPr>
             <a:r>
+              <a:rPr lang="nl-NL" dirty="0"/>
+              <a:t>technieken uitvoerig te </a:t>
+            </a:r>
+            <a:r>
               <a:rPr lang="nl-NL" dirty="0" smtClean="0"/>
-              <a:t>een </a:t>
+              <a:t>oefen </a:t>
             </a:r>
             <a:r>
               <a:rPr lang="nl-NL" dirty="0"/>
-              <a:t>individuele stijloefening met een reeks vastgelegde </a:t>
+              <a:t>en hierbij te streven naar perfectie in </a:t>
             </a:r>
             <a:r>
               <a:rPr lang="nl-NL" dirty="0" smtClean="0"/>
-              <a:t>bewegingen</a:t>
-            </a:r>
-          </a:p>
-          <a:p>
-            <a:pPr marL="0" indent="0">
-              <a:lnSpc>
-                <a:spcPct val="100000"/>
-              </a:lnSpc>
-              <a:buNone/>
-            </a:pPr>
-            <a:endParaRPr lang="nl-NL" sz="1800" dirty="0" smtClean="0"/>
-          </a:p>
-          <a:p>
-            <a:pPr marL="0" indent="0">
-              <a:lnSpc>
-                <a:spcPct val="100000"/>
-              </a:lnSpc>
-              <a:buNone/>
-            </a:pPr>
-            <a:endParaRPr lang="nl-NL" sz="1800" dirty="0"/>
-          </a:p>
-          <a:p>
-            <a:pPr marL="0" indent="0">
-              <a:lnSpc>
-                <a:spcPct val="100000"/>
-              </a:lnSpc>
-              <a:buNone/>
-            </a:pPr>
-            <a:r>
-              <a:rPr lang="nl-NL" sz="2800" dirty="0" smtClean="0"/>
-              <a:t>Doel: </a:t>
+              <a:t>uitvoering</a:t>
             </a:r>
           </a:p>
           <a:p>
@@ -8023,35 +8876,8 @@
               </a:lnSpc>
             </a:pPr>
             <a:r>
-              <a:rPr lang="nl-NL" dirty="0"/>
-              <a:t>technieken uitvoerig te </a:t>
-            </a:r>
-            <a:r>
               <a:rPr lang="nl-NL" dirty="0" smtClean="0"/>
-              <a:t>oefen </a:t>
-            </a:r>
-            <a:r>
-              <a:rPr lang="nl-NL" dirty="0"/>
-              <a:t>en hierbij te streven naar perfectie in </a:t>
-            </a:r>
-            <a:r>
-              <a:rPr lang="nl-NL" dirty="0" smtClean="0"/>
-              <a:t>uitvoering</a:t>
-            </a:r>
-          </a:p>
-          <a:p>
-            <a:pPr>
-              <a:lnSpc>
-                <a:spcPct val="100000"/>
-              </a:lnSpc>
-            </a:pPr>
-            <a:r>
-              <a:rPr lang="nl-NL" dirty="0" smtClean="0"/>
-              <a:t>technieken eigen maken, zodat deze onder andere omstandigheden kunnen worden </a:t>
-            </a:r>
-            <a:r>
-              <a:rPr lang="nl-NL" dirty="0" smtClean="0"/>
-              <a:t>toegepast (in de praktijk)</a:t>
+              <a:t>technieken eigen maken, zodat deze onder andere omstandigheden kunnen worden toegepast (in de praktijk)</a:t>
             </a:r>
             <a:endParaRPr lang="nl-NL" dirty="0"/>
           </a:p>
@@ -8114,7 +8940,7 @@
                             </p:stCondLst>
                             <p:childTnLst>
                               <p:par>
-                                <p:cTn id="5" presetID="22" presetClass="entr" presetSubtype="4" fill="hold" nodeType="clickEffect">
+                                <p:cTn id="5" presetID="10" presetClass="entr" presetSubtype="0" fill="hold" nodeType="clickEffect">
                                   <p:stCondLst>
                                     <p:cond delay="0"/>
                                   </p:stCondLst>
@@ -8141,13 +8967,196 @@
                                         <p:strVal val="visible"/>
                                       </p:to>
                                     </p:set>
-                                    <p:animEffect transition="in" filter="wipe(down)">
+                                    <p:animEffect transition="in" filter="fade">
                                       <p:cBhvr>
                                         <p:cTn id="7" dur="500"/>
                                         <p:tgtEl>
                                           <p:spTgt spid="6">
                                             <p:txEl>
                                               <p:pRg st="0" end="0"/>
+                                            </p:txEl>
+                                          </p:spTgt>
+                                        </p:tgtEl>
+                                      </p:cBhvr>
+                                    </p:animEffect>
+                                  </p:childTnLst>
+                                </p:cTn>
+                              </p:par>
+                            </p:childTnLst>
+                          </p:cTn>
+                        </p:par>
+                      </p:childTnLst>
+                    </p:cTn>
+                  </p:par>
+                  <p:par>
+                    <p:cTn id="8" fill="hold">
+                      <p:stCondLst>
+                        <p:cond delay="indefinite"/>
+                      </p:stCondLst>
+                      <p:childTnLst>
+                        <p:par>
+                          <p:cTn id="9" fill="hold">
+                            <p:stCondLst>
+                              <p:cond delay="0"/>
+                            </p:stCondLst>
+                            <p:childTnLst>
+                              <p:par>
+                                <p:cTn id="10" presetID="10" presetClass="entr" presetSubtype="0" fill="hold" nodeType="clickEffect">
+                                  <p:stCondLst>
+                                    <p:cond delay="0"/>
+                                  </p:stCondLst>
+                                  <p:childTnLst>
+                                    <p:set>
+                                      <p:cBhvr>
+                                        <p:cTn id="11" dur="1" fill="hold">
+                                          <p:stCondLst>
+                                            <p:cond delay="0"/>
+                                          </p:stCondLst>
+                                        </p:cTn>
+                                        <p:tgtEl>
+                                          <p:spTgt spid="6">
+                                            <p:txEl>
+                                              <p:pRg st="3" end="3"/>
+                                            </p:txEl>
+                                          </p:spTgt>
+                                        </p:tgtEl>
+                                        <p:attrNameLst>
+                                          <p:attrName>style.visibility</p:attrName>
+                                        </p:attrNameLst>
+                                      </p:cBhvr>
+                                      <p:to>
+                                        <p:strVal val="visible"/>
+                                      </p:to>
+                                    </p:set>
+                                    <p:animEffect transition="in" filter="fade">
+                                      <p:cBhvr>
+                                        <p:cTn id="12" dur="500"/>
+                                        <p:tgtEl>
+                                          <p:spTgt spid="6">
+                                            <p:txEl>
+                                              <p:pRg st="3" end="3"/>
+                                            </p:txEl>
+                                          </p:spTgt>
+                                        </p:tgtEl>
+                                      </p:cBhvr>
+                                    </p:animEffect>
+                                  </p:childTnLst>
+                                </p:cTn>
+                              </p:par>
+                            </p:childTnLst>
+                          </p:cTn>
+                        </p:par>
+                      </p:childTnLst>
+                    </p:cTn>
+                  </p:par>
+                  <p:par>
+                    <p:cTn id="13" fill="hold">
+                      <p:stCondLst>
+                        <p:cond delay="indefinite"/>
+                      </p:stCondLst>
+                      <p:childTnLst>
+                        <p:par>
+                          <p:cTn id="14" fill="hold">
+                            <p:stCondLst>
+                              <p:cond delay="0"/>
+                            </p:stCondLst>
+                            <p:childTnLst>
+                              <p:par>
+                                <p:cTn id="15" presetID="10" presetClass="entr" presetSubtype="0" fill="hold" nodeType="clickEffect">
+                                  <p:stCondLst>
+                                    <p:cond delay="0"/>
+                                  </p:stCondLst>
+                                  <p:childTnLst>
+                                    <p:set>
+                                      <p:cBhvr>
+                                        <p:cTn id="16" dur="1" fill="hold">
+                                          <p:stCondLst>
+                                            <p:cond delay="0"/>
+                                          </p:stCondLst>
+                                        </p:cTn>
+                                        <p:tgtEl>
+                                          <p:spTgt spid="6">
+                                            <p:txEl>
+                                              <p:pRg st="4" end="4"/>
+                                            </p:txEl>
+                                          </p:spTgt>
+                                        </p:tgtEl>
+                                        <p:attrNameLst>
+                                          <p:attrName>style.visibility</p:attrName>
+                                        </p:attrNameLst>
+                                      </p:cBhvr>
+                                      <p:to>
+                                        <p:strVal val="visible"/>
+                                      </p:to>
+                                    </p:set>
+                                    <p:animEffect transition="in" filter="fade">
+                                      <p:cBhvr>
+                                        <p:cTn id="17" dur="500"/>
+                                        <p:tgtEl>
+                                          <p:spTgt spid="6">
+                                            <p:txEl>
+                                              <p:pRg st="4" end="4"/>
+                                            </p:txEl>
+                                          </p:spTgt>
+                                        </p:tgtEl>
+                                      </p:cBhvr>
+                                    </p:animEffect>
+                                  </p:childTnLst>
+                                </p:cTn>
+                              </p:par>
+                            </p:childTnLst>
+                          </p:cTn>
+                        </p:par>
+                      </p:childTnLst>
+                    </p:cTn>
+                  </p:par>
+                  <p:par>
+                    <p:cTn id="18" fill="hold">
+                      <p:stCondLst>
+                        <p:cond delay="indefinite"/>
+                      </p:stCondLst>
+                      <p:childTnLst>
+                        <p:par>
+                          <p:cTn id="19" fill="hold">
+                            <p:stCondLst>
+                              <p:cond delay="0"/>
+                            </p:stCondLst>
+                            <p:childTnLst>
+                              <p:par>
+                                <p:cTn id="20" presetID="10" presetClass="entr" presetSubtype="0" fill="hold" nodeType="clickEffect">
+                                  <p:stCondLst>
+                                    <p:cond delay="0"/>
+                                  </p:stCondLst>
+                                  <p:childTnLst>
+                                    <p:set>
+                                      <p:cBhvr>
+                                        <p:cTn id="21" dur="1" fill="hold">
+                                          <p:stCondLst>
+                                            <p:cond delay="0"/>
+                                          </p:stCondLst>
+                                        </p:cTn>
+                                        <p:tgtEl>
+                                          <p:spTgt spid="6">
+                                            <p:txEl>
+                                              <p:pRg st="5" end="5"/>
+                                            </p:txEl>
+                                          </p:spTgt>
+                                        </p:tgtEl>
+                                        <p:attrNameLst>
+                                          <p:attrName>style.visibility</p:attrName>
+                                        </p:attrNameLst>
+                                      </p:cBhvr>
+                                      <p:to>
+                                        <p:strVal val="visible"/>
+                                      </p:to>
+                                    </p:set>
+                                    <p:animEffect transition="in" filter="fade">
+                                      <p:cBhvr>
+                                        <p:cTn id="22" dur="500"/>
+                                        <p:tgtEl>
+                                          <p:spTgt spid="6">
+                                            <p:txEl>
+                                              <p:pRg st="5" end="5"/>
                                             </p:txEl>
                                           </p:spTgt>
                                         </p:tgtEl>
@@ -8228,10 +9237,13 @@
               <a:rPr lang="nl-NL" dirty="0" smtClean="0">
                 <a:latin typeface="Bebas Neue" panose="020B0000000000000000" pitchFamily="34" charset="0"/>
               </a:rPr>
-              <a:t>Wat is een (</a:t>
+              <a:t>Wat is een </a:t>
             </a:r>
             <a:r>
               <a:rPr lang="nl-NL" dirty="0" err="1" smtClean="0">
+                <a:solidFill>
+                  <a:srgbClr val="A5CD39"/>
+                </a:solidFill>
                 <a:latin typeface="Bebas Neue" panose="020B0000000000000000" pitchFamily="34" charset="0"/>
               </a:rPr>
               <a:t>coding</a:t>
@@ -8240,7 +9252,7 @@
               <a:rPr lang="nl-NL" dirty="0" smtClean="0">
                 <a:latin typeface="Bebas Neue" panose="020B0000000000000000" pitchFamily="34" charset="0"/>
               </a:rPr>
-              <a:t>) </a:t>
+              <a:t> </a:t>
             </a:r>
             <a:r>
               <a:rPr lang="nl-NL" dirty="0" err="1" smtClean="0">
@@ -8318,34 +9330,6 @@
           <a:bodyPr/>
           <a:lstStyle/>
           <a:p>
-            <a:pPr marL="0" indent="0">
-              <a:lnSpc>
-                <a:spcPct val="100000"/>
-              </a:lnSpc>
-              <a:buNone/>
-            </a:pPr>
-            <a:r>
-              <a:rPr lang="nl-NL" sz="2800" dirty="0"/>
-              <a:t>Een </a:t>
-            </a:r>
-            <a:r>
-              <a:rPr lang="nl-NL" sz="3200" b="1" dirty="0" err="1"/>
-              <a:t>Coding</a:t>
-            </a:r>
-            <a:r>
-              <a:rPr lang="nl-NL" sz="2800" dirty="0"/>
-              <a:t> </a:t>
-            </a:r>
-            <a:r>
-              <a:rPr lang="nl-NL" sz="2800" dirty="0" err="1"/>
-              <a:t>kata</a:t>
-            </a:r>
-            <a:r>
-              <a:rPr lang="nl-NL" sz="2800" dirty="0"/>
-              <a:t> is:</a:t>
-            </a:r>
-          </a:p>
-          <a:p>
             <a:pPr>
               <a:lnSpc>
                 <a:spcPct val="100000"/>
@@ -8353,7 +9337,11 @@
             </a:pPr>
             <a:r>
               <a:rPr lang="nl-NL" sz="2800" dirty="0" smtClean="0"/>
-              <a:t>Het leren / toepassen van een of meerdere skills aan de hand van een oefeningen</a:t>
+              <a:t>Het </a:t>
+            </a:r>
+            <a:r>
+              <a:rPr lang="nl-NL" sz="2800" dirty="0" smtClean="0"/>
+              <a:t>leren / toepassen van een of meerdere skills aan de hand van een oefeningen</a:t>
             </a:r>
           </a:p>
           <a:p>
@@ -8461,7 +9449,317 @@
   <p:timing>
     <p:tnLst>
       <p:par>
-        <p:cTn id="1" dur="indefinite" restart="never" nodeType="tmRoot"/>
+        <p:cTn id="1" dur="indefinite" restart="never" nodeType="tmRoot">
+          <p:childTnLst>
+            <p:seq concurrent="1" nextAc="seek">
+              <p:cTn id="2" dur="indefinite" nodeType="mainSeq">
+                <p:childTnLst>
+                  <p:par>
+                    <p:cTn id="3" fill="hold">
+                      <p:stCondLst>
+                        <p:cond delay="indefinite"/>
+                      </p:stCondLst>
+                      <p:childTnLst>
+                        <p:par>
+                          <p:cTn id="4" fill="hold">
+                            <p:stCondLst>
+                              <p:cond delay="0"/>
+                            </p:stCondLst>
+                            <p:childTnLst>
+                              <p:par>
+                                <p:cTn id="5" presetID="10" presetClass="entr" presetSubtype="0" fill="hold" nodeType="clickEffect">
+                                  <p:stCondLst>
+                                    <p:cond delay="0"/>
+                                  </p:stCondLst>
+                                  <p:childTnLst>
+                                    <p:set>
+                                      <p:cBhvr>
+                                        <p:cTn id="6" dur="1" fill="hold">
+                                          <p:stCondLst>
+                                            <p:cond delay="0"/>
+                                          </p:stCondLst>
+                                        </p:cTn>
+                                        <p:tgtEl>
+                                          <p:spTgt spid="6">
+                                            <p:txEl>
+                                              <p:pRg st="0" end="0"/>
+                                            </p:txEl>
+                                          </p:spTgt>
+                                        </p:tgtEl>
+                                        <p:attrNameLst>
+                                          <p:attrName>style.visibility</p:attrName>
+                                        </p:attrNameLst>
+                                      </p:cBhvr>
+                                      <p:to>
+                                        <p:strVal val="visible"/>
+                                      </p:to>
+                                    </p:set>
+                                    <p:animEffect transition="in" filter="fade">
+                                      <p:cBhvr>
+                                        <p:cTn id="7" dur="500"/>
+                                        <p:tgtEl>
+                                          <p:spTgt spid="6">
+                                            <p:txEl>
+                                              <p:pRg st="0" end="0"/>
+                                            </p:txEl>
+                                          </p:spTgt>
+                                        </p:tgtEl>
+                                      </p:cBhvr>
+                                    </p:animEffect>
+                                  </p:childTnLst>
+                                </p:cTn>
+                              </p:par>
+                            </p:childTnLst>
+                          </p:cTn>
+                        </p:par>
+                      </p:childTnLst>
+                    </p:cTn>
+                  </p:par>
+                  <p:par>
+                    <p:cTn id="8" fill="hold">
+                      <p:stCondLst>
+                        <p:cond delay="indefinite"/>
+                      </p:stCondLst>
+                      <p:childTnLst>
+                        <p:par>
+                          <p:cTn id="9" fill="hold">
+                            <p:stCondLst>
+                              <p:cond delay="0"/>
+                            </p:stCondLst>
+                            <p:childTnLst>
+                              <p:par>
+                                <p:cTn id="10" presetID="10" presetClass="entr" presetSubtype="0" fill="hold" nodeType="clickEffect">
+                                  <p:stCondLst>
+                                    <p:cond delay="0"/>
+                                  </p:stCondLst>
+                                  <p:childTnLst>
+                                    <p:set>
+                                      <p:cBhvr>
+                                        <p:cTn id="11" dur="1" fill="hold">
+                                          <p:stCondLst>
+                                            <p:cond delay="0"/>
+                                          </p:stCondLst>
+                                        </p:cTn>
+                                        <p:tgtEl>
+                                          <p:spTgt spid="6">
+                                            <p:txEl>
+                                              <p:pRg st="1" end="1"/>
+                                            </p:txEl>
+                                          </p:spTgt>
+                                        </p:tgtEl>
+                                        <p:attrNameLst>
+                                          <p:attrName>style.visibility</p:attrName>
+                                        </p:attrNameLst>
+                                      </p:cBhvr>
+                                      <p:to>
+                                        <p:strVal val="visible"/>
+                                      </p:to>
+                                    </p:set>
+                                    <p:animEffect transition="in" filter="fade">
+                                      <p:cBhvr>
+                                        <p:cTn id="12" dur="500"/>
+                                        <p:tgtEl>
+                                          <p:spTgt spid="6">
+                                            <p:txEl>
+                                              <p:pRg st="1" end="1"/>
+                                            </p:txEl>
+                                          </p:spTgt>
+                                        </p:tgtEl>
+                                      </p:cBhvr>
+                                    </p:animEffect>
+                                  </p:childTnLst>
+                                </p:cTn>
+                              </p:par>
+                            </p:childTnLst>
+                          </p:cTn>
+                        </p:par>
+                      </p:childTnLst>
+                    </p:cTn>
+                  </p:par>
+                  <p:par>
+                    <p:cTn id="13" fill="hold">
+                      <p:stCondLst>
+                        <p:cond delay="indefinite"/>
+                      </p:stCondLst>
+                      <p:childTnLst>
+                        <p:par>
+                          <p:cTn id="14" fill="hold">
+                            <p:stCondLst>
+                              <p:cond delay="0"/>
+                            </p:stCondLst>
+                            <p:childTnLst>
+                              <p:par>
+                                <p:cTn id="15" presetID="10" presetClass="entr" presetSubtype="0" fill="hold" nodeType="clickEffect">
+                                  <p:stCondLst>
+                                    <p:cond delay="0"/>
+                                  </p:stCondLst>
+                                  <p:childTnLst>
+                                    <p:set>
+                                      <p:cBhvr>
+                                        <p:cTn id="16" dur="1" fill="hold">
+                                          <p:stCondLst>
+                                            <p:cond delay="0"/>
+                                          </p:stCondLst>
+                                        </p:cTn>
+                                        <p:tgtEl>
+                                          <p:spTgt spid="6">
+                                            <p:txEl>
+                                              <p:pRg st="4" end="4"/>
+                                            </p:txEl>
+                                          </p:spTgt>
+                                        </p:tgtEl>
+                                        <p:attrNameLst>
+                                          <p:attrName>style.visibility</p:attrName>
+                                        </p:attrNameLst>
+                                      </p:cBhvr>
+                                      <p:to>
+                                        <p:strVal val="visible"/>
+                                      </p:to>
+                                    </p:set>
+                                    <p:animEffect transition="in" filter="fade">
+                                      <p:cBhvr>
+                                        <p:cTn id="17" dur="500"/>
+                                        <p:tgtEl>
+                                          <p:spTgt spid="6">
+                                            <p:txEl>
+                                              <p:pRg st="4" end="4"/>
+                                            </p:txEl>
+                                          </p:spTgt>
+                                        </p:tgtEl>
+                                      </p:cBhvr>
+                                    </p:animEffect>
+                                  </p:childTnLst>
+                                </p:cTn>
+                              </p:par>
+                              <p:par>
+                                <p:cTn id="18" presetID="10" presetClass="entr" presetSubtype="0" fill="hold" nodeType="withEffect">
+                                  <p:stCondLst>
+                                    <p:cond delay="0"/>
+                                  </p:stCondLst>
+                                  <p:childTnLst>
+                                    <p:set>
+                                      <p:cBhvr>
+                                        <p:cTn id="19" dur="1" fill="hold">
+                                          <p:stCondLst>
+                                            <p:cond delay="0"/>
+                                          </p:stCondLst>
+                                        </p:cTn>
+                                        <p:tgtEl>
+                                          <p:spTgt spid="6">
+                                            <p:txEl>
+                                              <p:pRg st="5" end="5"/>
+                                            </p:txEl>
+                                          </p:spTgt>
+                                        </p:tgtEl>
+                                        <p:attrNameLst>
+                                          <p:attrName>style.visibility</p:attrName>
+                                        </p:attrNameLst>
+                                      </p:cBhvr>
+                                      <p:to>
+                                        <p:strVal val="visible"/>
+                                      </p:to>
+                                    </p:set>
+                                    <p:animEffect transition="in" filter="fade">
+                                      <p:cBhvr>
+                                        <p:cTn id="20" dur="500"/>
+                                        <p:tgtEl>
+                                          <p:spTgt spid="6">
+                                            <p:txEl>
+                                              <p:pRg st="5" end="5"/>
+                                            </p:txEl>
+                                          </p:spTgt>
+                                        </p:tgtEl>
+                                      </p:cBhvr>
+                                    </p:animEffect>
+                                  </p:childTnLst>
+                                </p:cTn>
+                              </p:par>
+                            </p:childTnLst>
+                          </p:cTn>
+                        </p:par>
+                      </p:childTnLst>
+                    </p:cTn>
+                  </p:par>
+                  <p:par>
+                    <p:cTn id="21" fill="hold">
+                      <p:stCondLst>
+                        <p:cond delay="indefinite"/>
+                      </p:stCondLst>
+                      <p:childTnLst>
+                        <p:par>
+                          <p:cTn id="22" fill="hold">
+                            <p:stCondLst>
+                              <p:cond delay="0"/>
+                            </p:stCondLst>
+                            <p:childTnLst>
+                              <p:par>
+                                <p:cTn id="23" presetID="10" presetClass="entr" presetSubtype="0" fill="hold" nodeType="clickEffect">
+                                  <p:stCondLst>
+                                    <p:cond delay="0"/>
+                                  </p:stCondLst>
+                                  <p:childTnLst>
+                                    <p:set>
+                                      <p:cBhvr>
+                                        <p:cTn id="24" dur="1" fill="hold">
+                                          <p:stCondLst>
+                                            <p:cond delay="0"/>
+                                          </p:stCondLst>
+                                        </p:cTn>
+                                        <p:tgtEl>
+                                          <p:spTgt spid="6">
+                                            <p:txEl>
+                                              <p:pRg st="6" end="6"/>
+                                            </p:txEl>
+                                          </p:spTgt>
+                                        </p:tgtEl>
+                                        <p:attrNameLst>
+                                          <p:attrName>style.visibility</p:attrName>
+                                        </p:attrNameLst>
+                                      </p:cBhvr>
+                                      <p:to>
+                                        <p:strVal val="visible"/>
+                                      </p:to>
+                                    </p:set>
+                                    <p:animEffect transition="in" filter="fade">
+                                      <p:cBhvr>
+                                        <p:cTn id="25" dur="500"/>
+                                        <p:tgtEl>
+                                          <p:spTgt spid="6">
+                                            <p:txEl>
+                                              <p:pRg st="6" end="6"/>
+                                            </p:txEl>
+                                          </p:spTgt>
+                                        </p:tgtEl>
+                                      </p:cBhvr>
+                                    </p:animEffect>
+                                  </p:childTnLst>
+                                </p:cTn>
+                              </p:par>
+                            </p:childTnLst>
+                          </p:cTn>
+                        </p:par>
+                      </p:childTnLst>
+                    </p:cTn>
+                  </p:par>
+                </p:childTnLst>
+              </p:cTn>
+              <p:prevCondLst>
+                <p:cond evt="onPrev" delay="0">
+                  <p:tgtEl>
+                    <p:sldTgt/>
+                  </p:tgtEl>
+                </p:cond>
+              </p:prevCondLst>
+              <p:nextCondLst>
+                <p:cond evt="onNext" delay="0">
+                  <p:tgtEl>
+                    <p:sldTgt/>
+                  </p:tgtEl>
+                </p:cond>
+              </p:nextCondLst>
+            </p:seq>
+          </p:childTnLst>
+        </p:cTn>
       </p:par>
     </p:tnLst>
   </p:timing>
@@ -8663,6 +9961,18 @@
             <a:endParaRPr lang="nl-NL" sz="2200" dirty="0" smtClean="0"/>
           </a:p>
           <a:p>
+            <a:pPr lvl="1">
+              <a:lnSpc>
+                <a:spcPct val="100000"/>
+              </a:lnSpc>
+            </a:pPr>
+            <a:r>
+              <a:rPr lang="nl-NL" sz="2200" dirty="0" smtClean="0"/>
+              <a:t>Feedback / kijken naar andermans code</a:t>
+            </a:r>
+            <a:endParaRPr lang="nl-NL" sz="2200" dirty="0" smtClean="0"/>
+          </a:p>
+          <a:p>
             <a:pPr>
               <a:lnSpc>
                 <a:spcPct val="100000"/>
@@ -8756,7 +10066,428 @@
   <p:timing>
     <p:tnLst>
       <p:par>
-        <p:cTn id="1" dur="indefinite" restart="never" nodeType="tmRoot"/>
+        <p:cTn id="1" dur="indefinite" restart="never" nodeType="tmRoot">
+          <p:childTnLst>
+            <p:seq concurrent="1" nextAc="seek">
+              <p:cTn id="2" dur="indefinite" nodeType="mainSeq">
+                <p:childTnLst>
+                  <p:par>
+                    <p:cTn id="3" fill="hold">
+                      <p:stCondLst>
+                        <p:cond delay="indefinite"/>
+                      </p:stCondLst>
+                      <p:childTnLst>
+                        <p:par>
+                          <p:cTn id="4" fill="hold">
+                            <p:stCondLst>
+                              <p:cond delay="0"/>
+                            </p:stCondLst>
+                            <p:childTnLst>
+                              <p:par>
+                                <p:cTn id="5" presetID="10" presetClass="entr" presetSubtype="0" fill="hold" nodeType="clickEffect">
+                                  <p:stCondLst>
+                                    <p:cond delay="0"/>
+                                  </p:stCondLst>
+                                  <p:childTnLst>
+                                    <p:set>
+                                      <p:cBhvr>
+                                        <p:cTn id="6" dur="1" fill="hold">
+                                          <p:stCondLst>
+                                            <p:cond delay="0"/>
+                                          </p:stCondLst>
+                                        </p:cTn>
+                                        <p:tgtEl>
+                                          <p:spTgt spid="6">
+                                            <p:txEl>
+                                              <p:pRg st="0" end="0"/>
+                                            </p:txEl>
+                                          </p:spTgt>
+                                        </p:tgtEl>
+                                        <p:attrNameLst>
+                                          <p:attrName>style.visibility</p:attrName>
+                                        </p:attrNameLst>
+                                      </p:cBhvr>
+                                      <p:to>
+                                        <p:strVal val="visible"/>
+                                      </p:to>
+                                    </p:set>
+                                    <p:animEffect transition="in" filter="fade">
+                                      <p:cBhvr>
+                                        <p:cTn id="7" dur="500"/>
+                                        <p:tgtEl>
+                                          <p:spTgt spid="6">
+                                            <p:txEl>
+                                              <p:pRg st="0" end="0"/>
+                                            </p:txEl>
+                                          </p:spTgt>
+                                        </p:tgtEl>
+                                      </p:cBhvr>
+                                    </p:animEffect>
+                                  </p:childTnLst>
+                                </p:cTn>
+                              </p:par>
+                              <p:par>
+                                <p:cTn id="8" presetID="10" presetClass="entr" presetSubtype="0" fill="hold" nodeType="withEffect">
+                                  <p:stCondLst>
+                                    <p:cond delay="0"/>
+                                  </p:stCondLst>
+                                  <p:childTnLst>
+                                    <p:set>
+                                      <p:cBhvr>
+                                        <p:cTn id="9" dur="1" fill="hold">
+                                          <p:stCondLst>
+                                            <p:cond delay="0"/>
+                                          </p:stCondLst>
+                                        </p:cTn>
+                                        <p:tgtEl>
+                                          <p:spTgt spid="6">
+                                            <p:txEl>
+                                              <p:pRg st="1" end="1"/>
+                                            </p:txEl>
+                                          </p:spTgt>
+                                        </p:tgtEl>
+                                        <p:attrNameLst>
+                                          <p:attrName>style.visibility</p:attrName>
+                                        </p:attrNameLst>
+                                      </p:cBhvr>
+                                      <p:to>
+                                        <p:strVal val="visible"/>
+                                      </p:to>
+                                    </p:set>
+                                    <p:animEffect transition="in" filter="fade">
+                                      <p:cBhvr>
+                                        <p:cTn id="10" dur="500"/>
+                                        <p:tgtEl>
+                                          <p:spTgt spid="6">
+                                            <p:txEl>
+                                              <p:pRg st="1" end="1"/>
+                                            </p:txEl>
+                                          </p:spTgt>
+                                        </p:tgtEl>
+                                      </p:cBhvr>
+                                    </p:animEffect>
+                                  </p:childTnLst>
+                                </p:cTn>
+                              </p:par>
+                              <p:par>
+                                <p:cTn id="11" presetID="10" presetClass="entr" presetSubtype="0" fill="hold" nodeType="withEffect">
+                                  <p:stCondLst>
+                                    <p:cond delay="0"/>
+                                  </p:stCondLst>
+                                  <p:childTnLst>
+                                    <p:set>
+                                      <p:cBhvr>
+                                        <p:cTn id="12" dur="1" fill="hold">
+                                          <p:stCondLst>
+                                            <p:cond delay="0"/>
+                                          </p:stCondLst>
+                                        </p:cTn>
+                                        <p:tgtEl>
+                                          <p:spTgt spid="6">
+                                            <p:txEl>
+                                              <p:pRg st="2" end="2"/>
+                                            </p:txEl>
+                                          </p:spTgt>
+                                        </p:tgtEl>
+                                        <p:attrNameLst>
+                                          <p:attrName>style.visibility</p:attrName>
+                                        </p:attrNameLst>
+                                      </p:cBhvr>
+                                      <p:to>
+                                        <p:strVal val="visible"/>
+                                      </p:to>
+                                    </p:set>
+                                    <p:animEffect transition="in" filter="fade">
+                                      <p:cBhvr>
+                                        <p:cTn id="13" dur="500"/>
+                                        <p:tgtEl>
+                                          <p:spTgt spid="6">
+                                            <p:txEl>
+                                              <p:pRg st="2" end="2"/>
+                                            </p:txEl>
+                                          </p:spTgt>
+                                        </p:tgtEl>
+                                      </p:cBhvr>
+                                    </p:animEffect>
+                                  </p:childTnLst>
+                                </p:cTn>
+                              </p:par>
+                            </p:childTnLst>
+                          </p:cTn>
+                        </p:par>
+                      </p:childTnLst>
+                    </p:cTn>
+                  </p:par>
+                  <p:par>
+                    <p:cTn id="14" fill="hold">
+                      <p:stCondLst>
+                        <p:cond delay="indefinite"/>
+                      </p:stCondLst>
+                      <p:childTnLst>
+                        <p:par>
+                          <p:cTn id="15" fill="hold">
+                            <p:stCondLst>
+                              <p:cond delay="0"/>
+                            </p:stCondLst>
+                            <p:childTnLst>
+                              <p:par>
+                                <p:cTn id="16" presetID="10" presetClass="entr" presetSubtype="0" fill="hold" nodeType="clickEffect">
+                                  <p:stCondLst>
+                                    <p:cond delay="0"/>
+                                  </p:stCondLst>
+                                  <p:childTnLst>
+                                    <p:set>
+                                      <p:cBhvr>
+                                        <p:cTn id="17" dur="1" fill="hold">
+                                          <p:stCondLst>
+                                            <p:cond delay="0"/>
+                                          </p:stCondLst>
+                                        </p:cTn>
+                                        <p:tgtEl>
+                                          <p:spTgt spid="6">
+                                            <p:txEl>
+                                              <p:pRg st="4" end="4"/>
+                                            </p:txEl>
+                                          </p:spTgt>
+                                        </p:tgtEl>
+                                        <p:attrNameLst>
+                                          <p:attrName>style.visibility</p:attrName>
+                                        </p:attrNameLst>
+                                      </p:cBhvr>
+                                      <p:to>
+                                        <p:strVal val="visible"/>
+                                      </p:to>
+                                    </p:set>
+                                    <p:animEffect transition="in" filter="fade">
+                                      <p:cBhvr>
+                                        <p:cTn id="18" dur="500"/>
+                                        <p:tgtEl>
+                                          <p:spTgt spid="6">
+                                            <p:txEl>
+                                              <p:pRg st="4" end="4"/>
+                                            </p:txEl>
+                                          </p:spTgt>
+                                        </p:tgtEl>
+                                      </p:cBhvr>
+                                    </p:animEffect>
+                                  </p:childTnLst>
+                                </p:cTn>
+                              </p:par>
+                              <p:par>
+                                <p:cTn id="19" presetID="10" presetClass="entr" presetSubtype="0" fill="hold" nodeType="withEffect">
+                                  <p:stCondLst>
+                                    <p:cond delay="0"/>
+                                  </p:stCondLst>
+                                  <p:childTnLst>
+                                    <p:set>
+                                      <p:cBhvr>
+                                        <p:cTn id="20" dur="1" fill="hold">
+                                          <p:stCondLst>
+                                            <p:cond delay="0"/>
+                                          </p:stCondLst>
+                                        </p:cTn>
+                                        <p:tgtEl>
+                                          <p:spTgt spid="6">
+                                            <p:txEl>
+                                              <p:pRg st="5" end="5"/>
+                                            </p:txEl>
+                                          </p:spTgt>
+                                        </p:tgtEl>
+                                        <p:attrNameLst>
+                                          <p:attrName>style.visibility</p:attrName>
+                                        </p:attrNameLst>
+                                      </p:cBhvr>
+                                      <p:to>
+                                        <p:strVal val="visible"/>
+                                      </p:to>
+                                    </p:set>
+                                    <p:animEffect transition="in" filter="fade">
+                                      <p:cBhvr>
+                                        <p:cTn id="21" dur="500"/>
+                                        <p:tgtEl>
+                                          <p:spTgt spid="6">
+                                            <p:txEl>
+                                              <p:pRg st="5" end="5"/>
+                                            </p:txEl>
+                                          </p:spTgt>
+                                        </p:tgtEl>
+                                      </p:cBhvr>
+                                    </p:animEffect>
+                                  </p:childTnLst>
+                                </p:cTn>
+                              </p:par>
+                              <p:par>
+                                <p:cTn id="22" presetID="10" presetClass="entr" presetSubtype="0" fill="hold" nodeType="withEffect">
+                                  <p:stCondLst>
+                                    <p:cond delay="0"/>
+                                  </p:stCondLst>
+                                  <p:childTnLst>
+                                    <p:set>
+                                      <p:cBhvr>
+                                        <p:cTn id="23" dur="1" fill="hold">
+                                          <p:stCondLst>
+                                            <p:cond delay="0"/>
+                                          </p:stCondLst>
+                                        </p:cTn>
+                                        <p:tgtEl>
+                                          <p:spTgt spid="6">
+                                            <p:txEl>
+                                              <p:pRg st="6" end="6"/>
+                                            </p:txEl>
+                                          </p:spTgt>
+                                        </p:tgtEl>
+                                        <p:attrNameLst>
+                                          <p:attrName>style.visibility</p:attrName>
+                                        </p:attrNameLst>
+                                      </p:cBhvr>
+                                      <p:to>
+                                        <p:strVal val="visible"/>
+                                      </p:to>
+                                    </p:set>
+                                    <p:animEffect transition="in" filter="fade">
+                                      <p:cBhvr>
+                                        <p:cTn id="24" dur="500"/>
+                                        <p:tgtEl>
+                                          <p:spTgt spid="6">
+                                            <p:txEl>
+                                              <p:pRg st="6" end="6"/>
+                                            </p:txEl>
+                                          </p:spTgt>
+                                        </p:tgtEl>
+                                      </p:cBhvr>
+                                    </p:animEffect>
+                                  </p:childTnLst>
+                                </p:cTn>
+                              </p:par>
+                            </p:childTnLst>
+                          </p:cTn>
+                        </p:par>
+                      </p:childTnLst>
+                    </p:cTn>
+                  </p:par>
+                  <p:par>
+                    <p:cTn id="25" fill="hold">
+                      <p:stCondLst>
+                        <p:cond delay="indefinite"/>
+                      </p:stCondLst>
+                      <p:childTnLst>
+                        <p:par>
+                          <p:cTn id="26" fill="hold">
+                            <p:stCondLst>
+                              <p:cond delay="0"/>
+                            </p:stCondLst>
+                            <p:childTnLst>
+                              <p:par>
+                                <p:cTn id="27" presetID="10" presetClass="entr" presetSubtype="0" fill="hold" nodeType="clickEffect">
+                                  <p:stCondLst>
+                                    <p:cond delay="0"/>
+                                  </p:stCondLst>
+                                  <p:childTnLst>
+                                    <p:set>
+                                      <p:cBhvr>
+                                        <p:cTn id="28" dur="1" fill="hold">
+                                          <p:stCondLst>
+                                            <p:cond delay="0"/>
+                                          </p:stCondLst>
+                                        </p:cTn>
+                                        <p:tgtEl>
+                                          <p:spTgt spid="6">
+                                            <p:txEl>
+                                              <p:pRg st="8" end="8"/>
+                                            </p:txEl>
+                                          </p:spTgt>
+                                        </p:tgtEl>
+                                        <p:attrNameLst>
+                                          <p:attrName>style.visibility</p:attrName>
+                                        </p:attrNameLst>
+                                      </p:cBhvr>
+                                      <p:to>
+                                        <p:strVal val="visible"/>
+                                      </p:to>
+                                    </p:set>
+                                    <p:animEffect transition="in" filter="fade">
+                                      <p:cBhvr>
+                                        <p:cTn id="29" dur="500"/>
+                                        <p:tgtEl>
+                                          <p:spTgt spid="6">
+                                            <p:txEl>
+                                              <p:pRg st="8" end="8"/>
+                                            </p:txEl>
+                                          </p:spTgt>
+                                        </p:tgtEl>
+                                      </p:cBhvr>
+                                    </p:animEffect>
+                                  </p:childTnLst>
+                                </p:cTn>
+                              </p:par>
+                              <p:par>
+                                <p:cTn id="30" presetID="10" presetClass="entr" presetSubtype="0" fill="hold" nodeType="withEffect">
+                                  <p:stCondLst>
+                                    <p:cond delay="0"/>
+                                  </p:stCondLst>
+                                  <p:childTnLst>
+                                    <p:set>
+                                      <p:cBhvr>
+                                        <p:cTn id="31" dur="1" fill="hold">
+                                          <p:stCondLst>
+                                            <p:cond delay="0"/>
+                                          </p:stCondLst>
+                                        </p:cTn>
+                                        <p:tgtEl>
+                                          <p:spTgt spid="6">
+                                            <p:txEl>
+                                              <p:pRg st="9" end="9"/>
+                                            </p:txEl>
+                                          </p:spTgt>
+                                        </p:tgtEl>
+                                        <p:attrNameLst>
+                                          <p:attrName>style.visibility</p:attrName>
+                                        </p:attrNameLst>
+                                      </p:cBhvr>
+                                      <p:to>
+                                        <p:strVal val="visible"/>
+                                      </p:to>
+                                    </p:set>
+                                    <p:animEffect transition="in" filter="fade">
+                                      <p:cBhvr>
+                                        <p:cTn id="32" dur="500"/>
+                                        <p:tgtEl>
+                                          <p:spTgt spid="6">
+                                            <p:txEl>
+                                              <p:pRg st="9" end="9"/>
+                                            </p:txEl>
+                                          </p:spTgt>
+                                        </p:tgtEl>
+                                      </p:cBhvr>
+                                    </p:animEffect>
+                                  </p:childTnLst>
+                                </p:cTn>
+                              </p:par>
+                            </p:childTnLst>
+                          </p:cTn>
+                        </p:par>
+                      </p:childTnLst>
+                    </p:cTn>
+                  </p:par>
+                </p:childTnLst>
+              </p:cTn>
+              <p:prevCondLst>
+                <p:cond evt="onPrev" delay="0">
+                  <p:tgtEl>
+                    <p:sldTgt/>
+                  </p:tgtEl>
+                </p:cond>
+              </p:prevCondLst>
+              <p:nextCondLst>
+                <p:cond evt="onNext" delay="0">
+                  <p:tgtEl>
+                    <p:sldTgt/>
+                  </p:tgtEl>
+                </p:cond>
+              </p:nextCondLst>
+            </p:seq>
+          </p:childTnLst>
+        </p:cTn>
       </p:par>
     </p:tnLst>
   </p:timing>
@@ -9079,7 +10810,579 @@
   <p:timing>
     <p:tnLst>
       <p:par>
-        <p:cTn id="1" dur="indefinite" restart="never" nodeType="tmRoot"/>
+        <p:cTn id="1" dur="indefinite" restart="never" nodeType="tmRoot">
+          <p:childTnLst>
+            <p:seq concurrent="1" nextAc="seek">
+              <p:cTn id="2" dur="indefinite" nodeType="mainSeq">
+                <p:childTnLst>
+                  <p:par>
+                    <p:cTn id="3" fill="hold">
+                      <p:stCondLst>
+                        <p:cond delay="indefinite"/>
+                      </p:stCondLst>
+                      <p:childTnLst>
+                        <p:par>
+                          <p:cTn id="4" fill="hold">
+                            <p:stCondLst>
+                              <p:cond delay="0"/>
+                            </p:stCondLst>
+                            <p:childTnLst>
+                              <p:par>
+                                <p:cTn id="5" presetID="10" presetClass="entr" presetSubtype="0" fill="hold" nodeType="clickEffect">
+                                  <p:stCondLst>
+                                    <p:cond delay="0"/>
+                                  </p:stCondLst>
+                                  <p:childTnLst>
+                                    <p:set>
+                                      <p:cBhvr>
+                                        <p:cTn id="6" dur="1" fill="hold">
+                                          <p:stCondLst>
+                                            <p:cond delay="0"/>
+                                          </p:stCondLst>
+                                        </p:cTn>
+                                        <p:tgtEl>
+                                          <p:spTgt spid="6">
+                                            <p:txEl>
+                                              <p:pRg st="1" end="1"/>
+                                            </p:txEl>
+                                          </p:spTgt>
+                                        </p:tgtEl>
+                                        <p:attrNameLst>
+                                          <p:attrName>style.visibility</p:attrName>
+                                        </p:attrNameLst>
+                                      </p:cBhvr>
+                                      <p:to>
+                                        <p:strVal val="visible"/>
+                                      </p:to>
+                                    </p:set>
+                                    <p:animEffect transition="in" filter="fade">
+                                      <p:cBhvr>
+                                        <p:cTn id="7" dur="500"/>
+                                        <p:tgtEl>
+                                          <p:spTgt spid="6">
+                                            <p:txEl>
+                                              <p:pRg st="1" end="1"/>
+                                            </p:txEl>
+                                          </p:spTgt>
+                                        </p:tgtEl>
+                                      </p:cBhvr>
+                                    </p:animEffect>
+                                  </p:childTnLst>
+                                </p:cTn>
+                              </p:par>
+                            </p:childTnLst>
+                          </p:cTn>
+                        </p:par>
+                      </p:childTnLst>
+                    </p:cTn>
+                  </p:par>
+                  <p:par>
+                    <p:cTn id="8" fill="hold">
+                      <p:stCondLst>
+                        <p:cond delay="indefinite"/>
+                      </p:stCondLst>
+                      <p:childTnLst>
+                        <p:par>
+                          <p:cTn id="9" fill="hold">
+                            <p:stCondLst>
+                              <p:cond delay="0"/>
+                            </p:stCondLst>
+                            <p:childTnLst>
+                              <p:par>
+                                <p:cTn id="10" presetID="10" presetClass="entr" presetSubtype="0" fill="hold" nodeType="clickEffect">
+                                  <p:stCondLst>
+                                    <p:cond delay="0"/>
+                                  </p:stCondLst>
+                                  <p:childTnLst>
+                                    <p:set>
+                                      <p:cBhvr>
+                                        <p:cTn id="11" dur="1" fill="hold">
+                                          <p:stCondLst>
+                                            <p:cond delay="0"/>
+                                          </p:stCondLst>
+                                        </p:cTn>
+                                        <p:tgtEl>
+                                          <p:spTgt spid="6">
+                                            <p:txEl>
+                                              <p:pRg st="2" end="2"/>
+                                            </p:txEl>
+                                          </p:spTgt>
+                                        </p:tgtEl>
+                                        <p:attrNameLst>
+                                          <p:attrName>style.visibility</p:attrName>
+                                        </p:attrNameLst>
+                                      </p:cBhvr>
+                                      <p:to>
+                                        <p:strVal val="visible"/>
+                                      </p:to>
+                                    </p:set>
+                                    <p:animEffect transition="in" filter="fade">
+                                      <p:cBhvr>
+                                        <p:cTn id="12" dur="500"/>
+                                        <p:tgtEl>
+                                          <p:spTgt spid="6">
+                                            <p:txEl>
+                                              <p:pRg st="2" end="2"/>
+                                            </p:txEl>
+                                          </p:spTgt>
+                                        </p:tgtEl>
+                                      </p:cBhvr>
+                                    </p:animEffect>
+                                  </p:childTnLst>
+                                </p:cTn>
+                              </p:par>
+                            </p:childTnLst>
+                          </p:cTn>
+                        </p:par>
+                      </p:childTnLst>
+                    </p:cTn>
+                  </p:par>
+                  <p:par>
+                    <p:cTn id="13" fill="hold">
+                      <p:stCondLst>
+                        <p:cond delay="indefinite"/>
+                      </p:stCondLst>
+                      <p:childTnLst>
+                        <p:par>
+                          <p:cTn id="14" fill="hold">
+                            <p:stCondLst>
+                              <p:cond delay="0"/>
+                            </p:stCondLst>
+                            <p:childTnLst>
+                              <p:par>
+                                <p:cTn id="15" presetID="10" presetClass="entr" presetSubtype="0" fill="hold" nodeType="clickEffect">
+                                  <p:stCondLst>
+                                    <p:cond delay="0"/>
+                                  </p:stCondLst>
+                                  <p:childTnLst>
+                                    <p:set>
+                                      <p:cBhvr>
+                                        <p:cTn id="16" dur="1" fill="hold">
+                                          <p:stCondLst>
+                                            <p:cond delay="0"/>
+                                          </p:stCondLst>
+                                        </p:cTn>
+                                        <p:tgtEl>
+                                          <p:spTgt spid="6">
+                                            <p:txEl>
+                                              <p:pRg st="3" end="3"/>
+                                            </p:txEl>
+                                          </p:spTgt>
+                                        </p:tgtEl>
+                                        <p:attrNameLst>
+                                          <p:attrName>style.visibility</p:attrName>
+                                        </p:attrNameLst>
+                                      </p:cBhvr>
+                                      <p:to>
+                                        <p:strVal val="visible"/>
+                                      </p:to>
+                                    </p:set>
+                                    <p:animEffect transition="in" filter="fade">
+                                      <p:cBhvr>
+                                        <p:cTn id="17" dur="500"/>
+                                        <p:tgtEl>
+                                          <p:spTgt spid="6">
+                                            <p:txEl>
+                                              <p:pRg st="3" end="3"/>
+                                            </p:txEl>
+                                          </p:spTgt>
+                                        </p:tgtEl>
+                                      </p:cBhvr>
+                                    </p:animEffect>
+                                  </p:childTnLst>
+                                </p:cTn>
+                              </p:par>
+                            </p:childTnLst>
+                          </p:cTn>
+                        </p:par>
+                      </p:childTnLst>
+                    </p:cTn>
+                  </p:par>
+                  <p:par>
+                    <p:cTn id="18" fill="hold">
+                      <p:stCondLst>
+                        <p:cond delay="indefinite"/>
+                      </p:stCondLst>
+                      <p:childTnLst>
+                        <p:par>
+                          <p:cTn id="19" fill="hold">
+                            <p:stCondLst>
+                              <p:cond delay="0"/>
+                            </p:stCondLst>
+                            <p:childTnLst>
+                              <p:par>
+                                <p:cTn id="20" presetID="10" presetClass="entr" presetSubtype="0" fill="hold" nodeType="clickEffect">
+                                  <p:stCondLst>
+                                    <p:cond delay="0"/>
+                                  </p:stCondLst>
+                                  <p:childTnLst>
+                                    <p:set>
+                                      <p:cBhvr>
+                                        <p:cTn id="21" dur="1" fill="hold">
+                                          <p:stCondLst>
+                                            <p:cond delay="0"/>
+                                          </p:stCondLst>
+                                        </p:cTn>
+                                        <p:tgtEl>
+                                          <p:spTgt spid="6">
+                                            <p:txEl>
+                                              <p:pRg st="4" end="4"/>
+                                            </p:txEl>
+                                          </p:spTgt>
+                                        </p:tgtEl>
+                                        <p:attrNameLst>
+                                          <p:attrName>style.visibility</p:attrName>
+                                        </p:attrNameLst>
+                                      </p:cBhvr>
+                                      <p:to>
+                                        <p:strVal val="visible"/>
+                                      </p:to>
+                                    </p:set>
+                                    <p:animEffect transition="in" filter="fade">
+                                      <p:cBhvr>
+                                        <p:cTn id="22" dur="500"/>
+                                        <p:tgtEl>
+                                          <p:spTgt spid="6">
+                                            <p:txEl>
+                                              <p:pRg st="4" end="4"/>
+                                            </p:txEl>
+                                          </p:spTgt>
+                                        </p:tgtEl>
+                                      </p:cBhvr>
+                                    </p:animEffect>
+                                  </p:childTnLst>
+                                </p:cTn>
+                              </p:par>
+                            </p:childTnLst>
+                          </p:cTn>
+                        </p:par>
+                      </p:childTnLst>
+                    </p:cTn>
+                  </p:par>
+                  <p:par>
+                    <p:cTn id="23" fill="hold">
+                      <p:stCondLst>
+                        <p:cond delay="indefinite"/>
+                      </p:stCondLst>
+                      <p:childTnLst>
+                        <p:par>
+                          <p:cTn id="24" fill="hold">
+                            <p:stCondLst>
+                              <p:cond delay="0"/>
+                            </p:stCondLst>
+                            <p:childTnLst>
+                              <p:par>
+                                <p:cTn id="25" presetID="10" presetClass="entr" presetSubtype="0" fill="hold" nodeType="clickEffect">
+                                  <p:stCondLst>
+                                    <p:cond delay="0"/>
+                                  </p:stCondLst>
+                                  <p:childTnLst>
+                                    <p:set>
+                                      <p:cBhvr>
+                                        <p:cTn id="26" dur="1" fill="hold">
+                                          <p:stCondLst>
+                                            <p:cond delay="0"/>
+                                          </p:stCondLst>
+                                        </p:cTn>
+                                        <p:tgtEl>
+                                          <p:spTgt spid="6">
+                                            <p:txEl>
+                                              <p:pRg st="5" end="5"/>
+                                            </p:txEl>
+                                          </p:spTgt>
+                                        </p:tgtEl>
+                                        <p:attrNameLst>
+                                          <p:attrName>style.visibility</p:attrName>
+                                        </p:attrNameLst>
+                                      </p:cBhvr>
+                                      <p:to>
+                                        <p:strVal val="visible"/>
+                                      </p:to>
+                                    </p:set>
+                                    <p:animEffect transition="in" filter="fade">
+                                      <p:cBhvr>
+                                        <p:cTn id="27" dur="500"/>
+                                        <p:tgtEl>
+                                          <p:spTgt spid="6">
+                                            <p:txEl>
+                                              <p:pRg st="5" end="5"/>
+                                            </p:txEl>
+                                          </p:spTgt>
+                                        </p:tgtEl>
+                                      </p:cBhvr>
+                                    </p:animEffect>
+                                  </p:childTnLst>
+                                </p:cTn>
+                              </p:par>
+                            </p:childTnLst>
+                          </p:cTn>
+                        </p:par>
+                      </p:childTnLst>
+                    </p:cTn>
+                  </p:par>
+                  <p:par>
+                    <p:cTn id="28" fill="hold">
+                      <p:stCondLst>
+                        <p:cond delay="indefinite"/>
+                      </p:stCondLst>
+                      <p:childTnLst>
+                        <p:par>
+                          <p:cTn id="29" fill="hold">
+                            <p:stCondLst>
+                              <p:cond delay="0"/>
+                            </p:stCondLst>
+                            <p:childTnLst>
+                              <p:par>
+                                <p:cTn id="30" presetID="10" presetClass="entr" presetSubtype="0" fill="hold" nodeType="clickEffect">
+                                  <p:stCondLst>
+                                    <p:cond delay="0"/>
+                                  </p:stCondLst>
+                                  <p:childTnLst>
+                                    <p:set>
+                                      <p:cBhvr>
+                                        <p:cTn id="31" dur="1" fill="hold">
+                                          <p:stCondLst>
+                                            <p:cond delay="0"/>
+                                          </p:stCondLst>
+                                        </p:cTn>
+                                        <p:tgtEl>
+                                          <p:spTgt spid="6">
+                                            <p:txEl>
+                                              <p:pRg st="6" end="6"/>
+                                            </p:txEl>
+                                          </p:spTgt>
+                                        </p:tgtEl>
+                                        <p:attrNameLst>
+                                          <p:attrName>style.visibility</p:attrName>
+                                        </p:attrNameLst>
+                                      </p:cBhvr>
+                                      <p:to>
+                                        <p:strVal val="visible"/>
+                                      </p:to>
+                                    </p:set>
+                                    <p:animEffect transition="in" filter="fade">
+                                      <p:cBhvr>
+                                        <p:cTn id="32" dur="500"/>
+                                        <p:tgtEl>
+                                          <p:spTgt spid="6">
+                                            <p:txEl>
+                                              <p:pRg st="6" end="6"/>
+                                            </p:txEl>
+                                          </p:spTgt>
+                                        </p:tgtEl>
+                                      </p:cBhvr>
+                                    </p:animEffect>
+                                  </p:childTnLst>
+                                </p:cTn>
+                              </p:par>
+                            </p:childTnLst>
+                          </p:cTn>
+                        </p:par>
+                      </p:childTnLst>
+                    </p:cTn>
+                  </p:par>
+                  <p:par>
+                    <p:cTn id="33" fill="hold">
+                      <p:stCondLst>
+                        <p:cond delay="indefinite"/>
+                      </p:stCondLst>
+                      <p:childTnLst>
+                        <p:par>
+                          <p:cTn id="34" fill="hold">
+                            <p:stCondLst>
+                              <p:cond delay="0"/>
+                            </p:stCondLst>
+                            <p:childTnLst>
+                              <p:par>
+                                <p:cTn id="35" presetID="10" presetClass="entr" presetSubtype="0" fill="hold" nodeType="clickEffect">
+                                  <p:stCondLst>
+                                    <p:cond delay="0"/>
+                                  </p:stCondLst>
+                                  <p:childTnLst>
+                                    <p:set>
+                                      <p:cBhvr>
+                                        <p:cTn id="36" dur="1" fill="hold">
+                                          <p:stCondLst>
+                                            <p:cond delay="0"/>
+                                          </p:stCondLst>
+                                        </p:cTn>
+                                        <p:tgtEl>
+                                          <p:spTgt spid="6">
+                                            <p:txEl>
+                                              <p:pRg st="7" end="7"/>
+                                            </p:txEl>
+                                          </p:spTgt>
+                                        </p:tgtEl>
+                                        <p:attrNameLst>
+                                          <p:attrName>style.visibility</p:attrName>
+                                        </p:attrNameLst>
+                                      </p:cBhvr>
+                                      <p:to>
+                                        <p:strVal val="visible"/>
+                                      </p:to>
+                                    </p:set>
+                                    <p:animEffect transition="in" filter="fade">
+                                      <p:cBhvr>
+                                        <p:cTn id="37" dur="500"/>
+                                        <p:tgtEl>
+                                          <p:spTgt spid="6">
+                                            <p:txEl>
+                                              <p:pRg st="7" end="7"/>
+                                            </p:txEl>
+                                          </p:spTgt>
+                                        </p:tgtEl>
+                                      </p:cBhvr>
+                                    </p:animEffect>
+                                  </p:childTnLst>
+                                </p:cTn>
+                              </p:par>
+                            </p:childTnLst>
+                          </p:cTn>
+                        </p:par>
+                      </p:childTnLst>
+                    </p:cTn>
+                  </p:par>
+                  <p:par>
+                    <p:cTn id="38" fill="hold">
+                      <p:stCondLst>
+                        <p:cond delay="indefinite"/>
+                      </p:stCondLst>
+                      <p:childTnLst>
+                        <p:par>
+                          <p:cTn id="39" fill="hold">
+                            <p:stCondLst>
+                              <p:cond delay="0"/>
+                            </p:stCondLst>
+                            <p:childTnLst>
+                              <p:par>
+                                <p:cTn id="40" presetID="10" presetClass="entr" presetSubtype="0" fill="hold" nodeType="clickEffect">
+                                  <p:stCondLst>
+                                    <p:cond delay="0"/>
+                                  </p:stCondLst>
+                                  <p:childTnLst>
+                                    <p:set>
+                                      <p:cBhvr>
+                                        <p:cTn id="41" dur="1" fill="hold">
+                                          <p:stCondLst>
+                                            <p:cond delay="0"/>
+                                          </p:stCondLst>
+                                        </p:cTn>
+                                        <p:tgtEl>
+                                          <p:spTgt spid="6">
+                                            <p:txEl>
+                                              <p:pRg st="8" end="8"/>
+                                            </p:txEl>
+                                          </p:spTgt>
+                                        </p:tgtEl>
+                                        <p:attrNameLst>
+                                          <p:attrName>style.visibility</p:attrName>
+                                        </p:attrNameLst>
+                                      </p:cBhvr>
+                                      <p:to>
+                                        <p:strVal val="visible"/>
+                                      </p:to>
+                                    </p:set>
+                                    <p:animEffect transition="in" filter="fade">
+                                      <p:cBhvr>
+                                        <p:cTn id="42" dur="500"/>
+                                        <p:tgtEl>
+                                          <p:spTgt spid="6">
+                                            <p:txEl>
+                                              <p:pRg st="8" end="8"/>
+                                            </p:txEl>
+                                          </p:spTgt>
+                                        </p:tgtEl>
+                                      </p:cBhvr>
+                                    </p:animEffect>
+                                  </p:childTnLst>
+                                </p:cTn>
+                              </p:par>
+                            </p:childTnLst>
+                          </p:cTn>
+                        </p:par>
+                      </p:childTnLst>
+                    </p:cTn>
+                  </p:par>
+                  <p:par>
+                    <p:cTn id="43" fill="hold">
+                      <p:stCondLst>
+                        <p:cond delay="indefinite"/>
+                      </p:stCondLst>
+                      <p:childTnLst>
+                        <p:par>
+                          <p:cTn id="44" fill="hold">
+                            <p:stCondLst>
+                              <p:cond delay="0"/>
+                            </p:stCondLst>
+                            <p:childTnLst>
+                              <p:par>
+                                <p:cTn id="45" presetID="10" presetClass="entr" presetSubtype="0" fill="hold" nodeType="clickEffect">
+                                  <p:stCondLst>
+                                    <p:cond delay="0"/>
+                                  </p:stCondLst>
+                                  <p:childTnLst>
+                                    <p:set>
+                                      <p:cBhvr>
+                                        <p:cTn id="46" dur="1" fill="hold">
+                                          <p:stCondLst>
+                                            <p:cond delay="0"/>
+                                          </p:stCondLst>
+                                        </p:cTn>
+                                        <p:tgtEl>
+                                          <p:spTgt spid="6">
+                                            <p:txEl>
+                                              <p:pRg st="9" end="9"/>
+                                            </p:txEl>
+                                          </p:spTgt>
+                                        </p:tgtEl>
+                                        <p:attrNameLst>
+                                          <p:attrName>style.visibility</p:attrName>
+                                        </p:attrNameLst>
+                                      </p:cBhvr>
+                                      <p:to>
+                                        <p:strVal val="visible"/>
+                                      </p:to>
+                                    </p:set>
+                                    <p:animEffect transition="in" filter="fade">
+                                      <p:cBhvr>
+                                        <p:cTn id="47" dur="500"/>
+                                        <p:tgtEl>
+                                          <p:spTgt spid="6">
+                                            <p:txEl>
+                                              <p:pRg st="9" end="9"/>
+                                            </p:txEl>
+                                          </p:spTgt>
+                                        </p:tgtEl>
+                                      </p:cBhvr>
+                                    </p:animEffect>
+                                  </p:childTnLst>
+                                </p:cTn>
+                              </p:par>
+                            </p:childTnLst>
+                          </p:cTn>
+                        </p:par>
+                      </p:childTnLst>
+                    </p:cTn>
+                  </p:par>
+                </p:childTnLst>
+              </p:cTn>
+              <p:prevCondLst>
+                <p:cond evt="onPrev" delay="0">
+                  <p:tgtEl>
+                    <p:sldTgt/>
+                  </p:tgtEl>
+                </p:cond>
+              </p:prevCondLst>
+              <p:nextCondLst>
+                <p:cond evt="onNext" delay="0">
+                  <p:tgtEl>
+                    <p:sldTgt/>
+                  </p:tgtEl>
+                </p:cond>
+              </p:nextCondLst>
+            </p:seq>
+          </p:childTnLst>
+        </p:cTn>
       </p:par>
     </p:tnLst>
   </p:timing>

</xml_diff>

<commit_message>
Updated PP's after review with Marco
</commit_message>
<xml_diff>
--- a/Algemeen over Dojos/Coding Dojo.pptx
+++ b/Algemeen over Dojos/Coding Dojo.pptx
@@ -228,7 +228,7 @@
           <a:p>
             <a:fld id="{312D2A74-5733-489F-AE3E-678E3C4642CF}" type="datetimeFigureOut">
               <a:rPr lang="nl-NL" smtClean="0"/>
-              <a:t>30-3-2016</a:t>
+              <a:t>31-3-2016</a:t>
             </a:fld>
             <a:endParaRPr lang="nl-NL"/>
           </a:p>
@@ -6329,11 +6329,7 @@
             </a:pPr>
             <a:r>
               <a:rPr lang="nl-NL" sz="2800" dirty="0" smtClean="0"/>
-              <a:t>Wat </a:t>
-            </a:r>
-            <a:r>
-              <a:rPr lang="nl-NL" sz="2800" dirty="0" smtClean="0"/>
-              <a:t>is een (</a:t>
+              <a:t>Wat is een (</a:t>
             </a:r>
             <a:r>
               <a:rPr lang="nl-NL" sz="2800" dirty="0" err="1" smtClean="0"/>
@@ -6373,11 +6369,7 @@
             </a:pPr>
             <a:r>
               <a:rPr lang="nl-NL" sz="2800" dirty="0" smtClean="0"/>
-              <a:t>Principes </a:t>
-            </a:r>
-            <a:r>
-              <a:rPr lang="nl-NL" sz="2800" dirty="0" smtClean="0"/>
-              <a:t>van een </a:t>
+              <a:t>Principes van een </a:t>
             </a:r>
             <a:r>
               <a:rPr lang="nl-NL" sz="2800" dirty="0" err="1" smtClean="0"/>
@@ -6401,11 +6393,7 @@
             </a:pPr>
             <a:r>
               <a:rPr lang="nl-NL" sz="2800" dirty="0" smtClean="0"/>
-              <a:t>Basis </a:t>
-            </a:r>
-            <a:r>
-              <a:rPr lang="nl-NL" sz="2800" dirty="0" smtClean="0"/>
-              <a:t>skills waarmee we te maken gaan krijgen</a:t>
+              <a:t>Basis skills waarmee we te maken gaan krijgen</a:t>
             </a:r>
           </a:p>
           <a:p>
@@ -6445,11 +6433,7 @@
             </a:r>
             <a:r>
               <a:rPr lang="nl-NL" sz="2800" dirty="0" smtClean="0"/>
-              <a:t> 1: De </a:t>
-            </a:r>
-            <a:r>
-              <a:rPr lang="nl-NL" sz="2800" dirty="0" smtClean="0"/>
-              <a:t>Calculator </a:t>
+              <a:t> 1: De Calculator </a:t>
             </a:r>
             <a:r>
               <a:rPr lang="nl-NL" sz="2800" dirty="0" smtClean="0">
@@ -6461,13 +6445,6 @@
               </a:rPr>
               <a:t>(35 minuten)</a:t>
             </a:r>
-            <a:endParaRPr lang="nl-NL" sz="2800" dirty="0" smtClean="0">
-              <a:solidFill>
-                <a:schemeClr val="bg1">
-                  <a:lumMod val="65000"/>
-                </a:schemeClr>
-              </a:solidFill>
-            </a:endParaRPr>
           </a:p>
           <a:p>
             <a:pPr>
@@ -6485,11 +6462,7 @@
             </a:r>
             <a:r>
               <a:rPr lang="nl-NL" sz="2800" dirty="0" smtClean="0"/>
-              <a:t> 2: The </a:t>
-            </a:r>
-            <a:r>
-              <a:rPr lang="nl-NL" sz="2800" dirty="0" smtClean="0"/>
-              <a:t>Warehouse </a:t>
+              <a:t> 2: The Warehouse </a:t>
             </a:r>
             <a:r>
               <a:rPr lang="nl-NL" sz="2800" dirty="0" smtClean="0">
@@ -7144,11 +7117,7 @@
             </a:pPr>
             <a:r>
               <a:rPr lang="nl-NL" dirty="0" smtClean="0"/>
-              <a:t>Japans</a:t>
-            </a:r>
-            <a:r>
-              <a:rPr lang="nl-NL" dirty="0" smtClean="0"/>
-              <a:t>: </a:t>
+              <a:t>Japans: </a:t>
             </a:r>
             <a:r>
               <a:rPr lang="nl-NL" i="1" dirty="0"/>
@@ -7251,11 +7220,11 @@
   <p:clrMapOvr>
     <a:masterClrMapping/>
   </p:clrMapOvr>
-  <mc:AlternateContent xmlns:mc="http://schemas.openxmlformats.org/markup-compatibility/2006">
-    <mc:Choice xmlns:p14="http://schemas.microsoft.com/office/powerpoint/2010/main" Requires="p14">
+  <mc:AlternateContent xmlns:mc="http://schemas.openxmlformats.org/markup-compatibility/2006" xmlns:p14="http://schemas.microsoft.com/office/powerpoint/2010/main">
+    <mc:Choice Requires="p14">
       <p:transition p14:dur="10"/>
     </mc:Choice>
-    <mc:Fallback>
+    <mc:Fallback xmlns="">
       <p:transition/>
     </mc:Fallback>
   </mc:AlternateContent>
@@ -7282,7 +7251,7 @@
                               <p:par>
                                 <p:cTn id="5" presetID="9" presetClass="emph" presetSubtype="0" nodeType="clickEffect">
                                   <p:stCondLst>
-                                    <p:cond delay="100"/>
+                                    <p:cond delay="0"/>
                                   </p:stCondLst>
                                   <p:childTnLst>
                                     <p:set>
@@ -7310,33 +7279,15 @@
                                   </p:childTnLst>
                                 </p:cTn>
                               </p:par>
-                            </p:childTnLst>
-                          </p:cTn>
-                        </p:par>
-                      </p:childTnLst>
-                    </p:cTn>
-                  </p:par>
-                  <p:par>
-                    <p:cTn id="8" fill="hold">
-                      <p:stCondLst>
-                        <p:cond delay="indefinite"/>
-                      </p:stCondLst>
-                      <p:childTnLst>
-                        <p:par>
-                          <p:cTn id="9" fill="hold">
-                            <p:stCondLst>
-                              <p:cond delay="0"/>
-                            </p:stCondLst>
-                            <p:childTnLst>
                               <p:par>
-                                <p:cTn id="10" presetID="10" presetClass="entr" presetSubtype="0" fill="hold" nodeType="clickEffect">
+                                <p:cTn id="8" presetID="10" presetClass="entr" presetSubtype="0" fill="hold" nodeType="withEffect">
                                   <p:stCondLst>
-                                    <p:cond delay="0"/>
+                                    <p:cond delay="600"/>
                                   </p:stCondLst>
                                   <p:childTnLst>
                                     <p:set>
                                       <p:cBhvr>
-                                        <p:cTn id="11" dur="1" fill="hold">
+                                        <p:cTn id="9" dur="1" fill="hold">
                                           <p:stCondLst>
                                             <p:cond delay="0"/>
                                           </p:stCondLst>
@@ -7358,7 +7309,7 @@
                                     </p:set>
                                     <p:animEffect transition="in" filter="fade">
                                       <p:cBhvr>
-                                        <p:cTn id="12" dur="500"/>
+                                        <p:cTn id="10" dur="500"/>
                                         <p:tgtEl>
                                           <p:spTgt spid="6">
                                             <p:txEl>
@@ -7378,26 +7329,26 @@
                     </p:cTn>
                   </p:par>
                   <p:par>
-                    <p:cTn id="13" fill="hold">
+                    <p:cTn id="11" fill="hold">
                       <p:stCondLst>
                         <p:cond delay="indefinite"/>
                       </p:stCondLst>
                       <p:childTnLst>
                         <p:par>
-                          <p:cTn id="14" fill="hold">
+                          <p:cTn id="12" fill="hold">
                             <p:stCondLst>
                               <p:cond delay="0"/>
                             </p:stCondLst>
                             <p:childTnLst>
                               <p:par>
-                                <p:cTn id="15" presetID="10" presetClass="entr" presetSubtype="0" fill="hold" nodeType="clickEffect">
+                                <p:cTn id="13" presetID="10" presetClass="entr" presetSubtype="0" fill="hold" nodeType="clickEffect">
                                   <p:stCondLst>
                                     <p:cond delay="0"/>
                                   </p:stCondLst>
                                   <p:childTnLst>
                                     <p:set>
                                       <p:cBhvr>
-                                        <p:cTn id="16" dur="1" fill="hold">
+                                        <p:cTn id="14" dur="1" fill="hold">
                                           <p:stCondLst>
                                             <p:cond delay="0"/>
                                           </p:stCondLst>
@@ -7419,7 +7370,7 @@
                                     </p:set>
                                     <p:animEffect transition="in" filter="fade">
                                       <p:cBhvr>
-                                        <p:cTn id="17" dur="500"/>
+                                        <p:cTn id="15" dur="500"/>
                                         <p:tgtEl>
                                           <p:spTgt spid="6">
                                             <p:txEl>
@@ -7439,26 +7390,26 @@
                     </p:cTn>
                   </p:par>
                   <p:par>
-                    <p:cTn id="18" fill="hold">
+                    <p:cTn id="16" fill="hold">
                       <p:stCondLst>
                         <p:cond delay="indefinite"/>
                       </p:stCondLst>
                       <p:childTnLst>
                         <p:par>
-                          <p:cTn id="19" fill="hold">
+                          <p:cTn id="17" fill="hold">
                             <p:stCondLst>
                               <p:cond delay="0"/>
                             </p:stCondLst>
                             <p:childTnLst>
                               <p:par>
-                                <p:cTn id="20" presetID="10" presetClass="entr" presetSubtype="0" fill="hold" nodeType="clickEffect">
+                                <p:cTn id="18" presetID="10" presetClass="entr" presetSubtype="0" fill="hold" nodeType="clickEffect">
                                   <p:stCondLst>
                                     <p:cond delay="0"/>
                                   </p:stCondLst>
                                   <p:childTnLst>
                                     <p:set>
                                       <p:cBhvr>
-                                        <p:cTn id="21" dur="1" fill="hold">
+                                        <p:cTn id="19" dur="1" fill="hold">
                                           <p:stCondLst>
                                             <p:cond delay="0"/>
                                           </p:stCondLst>
@@ -7480,7 +7431,7 @@
                                     </p:set>
                                     <p:animEffect transition="in" filter="fade">
                                       <p:cBhvr>
-                                        <p:cTn id="22" dur="500"/>
+                                        <p:cTn id="20" dur="500"/>
                                         <p:tgtEl>
                                           <p:spTgt spid="6">
                                             <p:txEl>
@@ -7864,33 +7815,15 @@
                                   </p:childTnLst>
                                 </p:cTn>
                               </p:par>
-                            </p:childTnLst>
-                          </p:cTn>
-                        </p:par>
-                      </p:childTnLst>
-                    </p:cTn>
-                  </p:par>
-                  <p:par>
-                    <p:cTn id="8" fill="hold">
-                      <p:stCondLst>
-                        <p:cond delay="indefinite"/>
-                      </p:stCondLst>
-                      <p:childTnLst>
-                        <p:par>
-                          <p:cTn id="9" fill="hold">
-                            <p:stCondLst>
-                              <p:cond delay="0"/>
-                            </p:stCondLst>
-                            <p:childTnLst>
                               <p:par>
-                                <p:cTn id="10" presetID="22" presetClass="entr" presetSubtype="4" fill="hold" nodeType="clickEffect">
+                                <p:cTn id="8" presetID="22" presetClass="entr" presetSubtype="4" fill="hold" nodeType="withEffect">
                                   <p:stCondLst>
-                                    <p:cond delay="0"/>
+                                    <p:cond delay="600"/>
                                   </p:stCondLst>
                                   <p:childTnLst>
                                     <p:set>
                                       <p:cBhvr>
-                                        <p:cTn id="11" dur="1" fill="hold">
+                                        <p:cTn id="9" dur="1" fill="hold">
                                           <p:stCondLst>
                                             <p:cond delay="0"/>
                                           </p:stCondLst>
@@ -7912,7 +7845,7 @@
                                     </p:set>
                                     <p:animEffect transition="in" filter="wipe(down)">
                                       <p:cBhvr>
-                                        <p:cTn id="12" dur="500"/>
+                                        <p:cTn id="10" dur="500"/>
                                         <p:tgtEl>
                                           <p:spTgt spid="6">
                                             <p:txEl>
@@ -7932,26 +7865,26 @@
                     </p:cTn>
                   </p:par>
                   <p:par>
-                    <p:cTn id="13" fill="hold">
+                    <p:cTn id="11" fill="hold">
                       <p:stCondLst>
                         <p:cond delay="indefinite"/>
                       </p:stCondLst>
                       <p:childTnLst>
                         <p:par>
-                          <p:cTn id="14" fill="hold">
+                          <p:cTn id="12" fill="hold">
                             <p:stCondLst>
                               <p:cond delay="0"/>
                             </p:stCondLst>
                             <p:childTnLst>
                               <p:par>
-                                <p:cTn id="15" presetID="22" presetClass="entr" presetSubtype="4" fill="hold" nodeType="clickEffect">
+                                <p:cTn id="13" presetID="22" presetClass="entr" presetSubtype="4" fill="hold" nodeType="clickEffect">
                                   <p:stCondLst>
                                     <p:cond delay="0"/>
                                   </p:stCondLst>
                                   <p:childTnLst>
                                     <p:set>
                                       <p:cBhvr>
-                                        <p:cTn id="16" dur="1" fill="hold">
+                                        <p:cTn id="14" dur="1" fill="hold">
                                           <p:stCondLst>
                                             <p:cond delay="0"/>
                                           </p:stCondLst>
@@ -7973,7 +7906,7 @@
                                     </p:set>
                                     <p:animEffect transition="in" filter="wipe(down)">
                                       <p:cBhvr>
-                                        <p:cTn id="17" dur="500"/>
+                                        <p:cTn id="15" dur="500"/>
                                         <p:tgtEl>
                                           <p:spTgt spid="6">
                                             <p:txEl>
@@ -7993,26 +7926,26 @@
                     </p:cTn>
                   </p:par>
                   <p:par>
-                    <p:cTn id="18" fill="hold">
+                    <p:cTn id="16" fill="hold">
                       <p:stCondLst>
                         <p:cond delay="indefinite"/>
                       </p:stCondLst>
                       <p:childTnLst>
                         <p:par>
-                          <p:cTn id="19" fill="hold">
+                          <p:cTn id="17" fill="hold">
                             <p:stCondLst>
                               <p:cond delay="0"/>
                             </p:stCondLst>
                             <p:childTnLst>
                               <p:par>
-                                <p:cTn id="20" presetID="22" presetClass="entr" presetSubtype="4" fill="hold" nodeType="clickEffect">
+                                <p:cTn id="18" presetID="22" presetClass="entr" presetSubtype="4" fill="hold" nodeType="clickEffect">
                                   <p:stCondLst>
                                     <p:cond delay="0"/>
                                   </p:stCondLst>
                                   <p:childTnLst>
                                     <p:set>
                                       <p:cBhvr>
-                                        <p:cTn id="21" dur="1" fill="hold">
+                                        <p:cTn id="19" dur="1" fill="hold">
                                           <p:stCondLst>
                                             <p:cond delay="0"/>
                                           </p:stCondLst>
@@ -8034,7 +7967,7 @@
                                     </p:set>
                                     <p:animEffect transition="in" filter="wipe(down)">
                                       <p:cBhvr>
-                                        <p:cTn id="22" dur="500"/>
+                                        <p:cTn id="20" dur="500"/>
                                         <p:tgtEl>
                                           <p:spTgt spid="6">
                                             <p:txEl>
@@ -8854,11 +8787,11 @@
             </a:pPr>
             <a:r>
               <a:rPr lang="nl-NL" dirty="0"/>
-              <a:t>technieken uitvoerig te </a:t>
+              <a:t>technieken uitvoerig </a:t>
             </a:r>
             <a:r>
               <a:rPr lang="nl-NL" dirty="0" smtClean="0"/>
-              <a:t>oefen </a:t>
+              <a:t>oefenen </a:t>
             </a:r>
             <a:r>
               <a:rPr lang="nl-NL" dirty="0"/>
@@ -9337,11 +9270,7 @@
             </a:pPr>
             <a:r>
               <a:rPr lang="nl-NL" sz="2800" dirty="0" smtClean="0"/>
-              <a:t>Het </a:t>
-            </a:r>
-            <a:r>
-              <a:rPr lang="nl-NL" sz="2800" dirty="0" smtClean="0"/>
-              <a:t>leren / toepassen van een of meerdere skills aan de hand van een oefeningen</a:t>
+              <a:t>Het leren / toepassen van een of meerdere skills aan de hand van een oefeningen</a:t>
             </a:r>
           </a:p>
           <a:p>
@@ -9816,10 +9745,10 @@
               <a:t> </a:t>
             </a:r>
             <a:r>
-              <a:rPr lang="nl-NL" dirty="0" err="1" smtClean="0">
+              <a:rPr lang="nl-NL" dirty="0" smtClean="0">
                 <a:latin typeface="Bebas Neue" panose="020B0000000000000000" pitchFamily="34" charset="0"/>
               </a:rPr>
-              <a:t>princiepes</a:t>
+              <a:t>principes</a:t>
             </a:r>
             <a:endParaRPr lang="nl-NL" dirty="0">
               <a:latin typeface="Bebas Neue" panose="020B0000000000000000" pitchFamily="34" charset="0"/>
@@ -9970,7 +9899,6 @@
               <a:rPr lang="nl-NL" sz="2200" dirty="0" smtClean="0"/>
               <a:t>Feedback / kijken naar andermans code</a:t>
             </a:r>
-            <a:endParaRPr lang="nl-NL" sz="2200" dirty="0" smtClean="0"/>
           </a:p>
           <a:p>
             <a:pPr>

</xml_diff>